<commit_message>
Updated ppt and functionality
</commit_message>
<xml_diff>
--- a/Zomato Data Analysis.pptx
+++ b/Zomato Data Analysis.pptx
@@ -10,33 +10,40 @@
     <p:sldId id="258" r:id="rId4"/>
     <p:sldId id="259" r:id="rId5"/>
     <p:sldId id="260" r:id="rId6"/>
-    <p:sldId id="261" r:id="rId7"/>
-    <p:sldId id="262" r:id="rId8"/>
-    <p:sldId id="263" r:id="rId9"/>
-    <p:sldId id="264" r:id="rId10"/>
-    <p:sldId id="265" r:id="rId11"/>
-    <p:sldId id="266" r:id="rId12"/>
-    <p:sldId id="267" r:id="rId13"/>
-    <p:sldId id="268" r:id="rId14"/>
-    <p:sldId id="269" r:id="rId15"/>
-    <p:sldId id="270" r:id="rId16"/>
-    <p:sldId id="271" r:id="rId17"/>
-    <p:sldId id="273" r:id="rId18"/>
-    <p:sldId id="272" r:id="rId19"/>
-    <p:sldId id="274" r:id="rId20"/>
-    <p:sldId id="275" r:id="rId21"/>
-    <p:sldId id="276" r:id="rId22"/>
-    <p:sldId id="277" r:id="rId23"/>
-    <p:sldId id="278" r:id="rId24"/>
-    <p:sldId id="279" r:id="rId25"/>
-    <p:sldId id="280" r:id="rId26"/>
-    <p:sldId id="281" r:id="rId27"/>
-    <p:sldId id="282" r:id="rId28"/>
-    <p:sldId id="283" r:id="rId29"/>
-    <p:sldId id="284" r:id="rId30"/>
-    <p:sldId id="285" r:id="rId31"/>
-    <p:sldId id="286" r:id="rId32"/>
-    <p:sldId id="287" r:id="rId33"/>
+    <p:sldId id="288" r:id="rId7"/>
+    <p:sldId id="261" r:id="rId8"/>
+    <p:sldId id="262" r:id="rId9"/>
+    <p:sldId id="263" r:id="rId10"/>
+    <p:sldId id="264" r:id="rId11"/>
+    <p:sldId id="265" r:id="rId12"/>
+    <p:sldId id="266" r:id="rId13"/>
+    <p:sldId id="267" r:id="rId14"/>
+    <p:sldId id="268" r:id="rId15"/>
+    <p:sldId id="269" r:id="rId16"/>
+    <p:sldId id="270" r:id="rId17"/>
+    <p:sldId id="271" r:id="rId18"/>
+    <p:sldId id="273" r:id="rId19"/>
+    <p:sldId id="289" r:id="rId20"/>
+    <p:sldId id="272" r:id="rId21"/>
+    <p:sldId id="274" r:id="rId22"/>
+    <p:sldId id="275" r:id="rId23"/>
+    <p:sldId id="290" r:id="rId24"/>
+    <p:sldId id="276" r:id="rId25"/>
+    <p:sldId id="277" r:id="rId26"/>
+    <p:sldId id="278" r:id="rId27"/>
+    <p:sldId id="279" r:id="rId28"/>
+    <p:sldId id="280" r:id="rId29"/>
+    <p:sldId id="281" r:id="rId30"/>
+    <p:sldId id="282" r:id="rId31"/>
+    <p:sldId id="291" r:id="rId32"/>
+    <p:sldId id="283" r:id="rId33"/>
+    <p:sldId id="284" r:id="rId34"/>
+    <p:sldId id="285" r:id="rId35"/>
+    <p:sldId id="292" r:id="rId36"/>
+    <p:sldId id="286" r:id="rId37"/>
+    <p:sldId id="287" r:id="rId38"/>
+    <p:sldId id="294" r:id="rId39"/>
+    <p:sldId id="293" r:id="rId40"/>
   </p:sldIdLst>
   <p:sldSz cx="9144000" cy="6858000" type="screen4x3"/>
   <p:notesSz cx="6858000" cy="9144000"/>
@@ -3299,7 +3306,7 @@
         </p:nvSpPr>
         <p:spPr>
           <a:xfrm>
-            <a:off x="304800" y="1860042"/>
+            <a:off x="304800" y="1676400"/>
             <a:ext cx="304800" cy="121158"/>
           </a:xfrm>
           <a:prstGeom prst="rightArrow">
@@ -3333,7 +3340,7 @@
       </p:sp>
       <p:pic>
         <p:nvPicPr>
-          <p:cNvPr id="8194" name="Picture 2"/>
+          <p:cNvPr id="7170" name="Picture 2"/>
           <p:cNvPicPr>
             <a:picLocks noChangeAspect="1" noChangeArrowheads="1"/>
           </p:cNvPicPr>
@@ -3354,8 +3361,8 @@
         </p:blipFill>
         <p:spPr bwMode="auto">
           <a:xfrm>
-            <a:off x="2667000" y="1295400"/>
-            <a:ext cx="8345487" cy="5229225"/>
+            <a:off x="2590800" y="1371600"/>
+            <a:ext cx="8364537" cy="5562600"/>
           </a:xfrm>
           <a:prstGeom prst="rect">
             <a:avLst/>
@@ -3398,7 +3405,7 @@
     </p:spTree>
     <p:extLst>
       <p:ext uri="{BB962C8B-B14F-4D97-AF65-F5344CB8AC3E}">
-        <p14:creationId xmlns:p14="http://schemas.microsoft.com/office/powerpoint/2010/main" val="1388506614"/>
+        <p14:creationId xmlns:p14="http://schemas.microsoft.com/office/powerpoint/2010/main" val="2712418149"/>
       </p:ext>
     </p:extLst>
   </p:cSld>
@@ -3568,7 +3575,7 @@
       </p:sp>
       <p:pic>
         <p:nvPicPr>
-          <p:cNvPr id="9218" name="Picture 2"/>
+          <p:cNvPr id="8194" name="Picture 2"/>
           <p:cNvPicPr>
             <a:picLocks noChangeAspect="1" noChangeArrowheads="1"/>
           </p:cNvPicPr>
@@ -3589,8 +3596,8 @@
         </p:blipFill>
         <p:spPr bwMode="auto">
           <a:xfrm>
-            <a:off x="2743200" y="1219200"/>
-            <a:ext cx="8469313" cy="3867150"/>
+            <a:off x="2667000" y="1295400"/>
+            <a:ext cx="8345487" cy="5229225"/>
           </a:xfrm>
           <a:prstGeom prst="rect">
             <a:avLst/>
@@ -3633,7 +3640,7 @@
     </p:spTree>
     <p:extLst>
       <p:ext uri="{BB962C8B-B14F-4D97-AF65-F5344CB8AC3E}">
-        <p14:creationId xmlns:p14="http://schemas.microsoft.com/office/powerpoint/2010/main" val="602118267"/>
+        <p14:creationId xmlns:p14="http://schemas.microsoft.com/office/powerpoint/2010/main" val="1388506614"/>
       </p:ext>
     </p:extLst>
   </p:cSld>
@@ -3865,72 +3872,10 @@
           </a:extLst>
         </p:spPr>
       </p:pic>
-      <p:pic>
-        <p:nvPicPr>
-          <p:cNvPr id="6" name="Picture 3"/>
-          <p:cNvPicPr>
-            <a:picLocks noChangeAspect="1" noChangeArrowheads="1"/>
-          </p:cNvPicPr>
-          <p:nvPr/>
-        </p:nvPicPr>
-        <p:blipFill rotWithShape="1">
-          <a:blip r:embed="rId4">
-            <a:extLst>
-              <a:ext uri="{28A0092B-C50C-407E-A947-70E740481C1C}">
-                <a14:useLocalDpi xmlns:a14="http://schemas.microsoft.com/office/drawing/2010/main" val="0"/>
-              </a:ext>
-            </a:extLst>
-          </a:blip>
-          <a:srcRect l="-1" t="11488" r="61838" b="3726"/>
-          <a:stretch/>
-        </p:blipFill>
-        <p:spPr bwMode="auto">
-          <a:xfrm>
-            <a:off x="228600" y="4038600"/>
-            <a:ext cx="2743200" cy="2624667"/>
-          </a:xfrm>
-          <a:prstGeom prst="rect">
-            <a:avLst/>
-          </a:prstGeom>
-          <a:noFill/>
-          <a:ln>
-            <a:noFill/>
-          </a:ln>
-          <a:effectLst/>
-          <a:extLst>
-            <a:ext uri="{909E8E84-426E-40DD-AFC4-6F175D3DCCD1}">
-              <a14:hiddenFill xmlns:a14="http://schemas.microsoft.com/office/drawing/2010/main">
-                <a:solidFill>
-                  <a:schemeClr val="accent1"/>
-                </a:solidFill>
-              </a14:hiddenFill>
-            </a:ext>
-            <a:ext uri="{91240B29-F687-4F45-9708-019B960494DF}">
-              <a14:hiddenLine xmlns:a14="http://schemas.microsoft.com/office/drawing/2010/main" w="9525">
-                <a:solidFill>
-                  <a:schemeClr val="tx1"/>
-                </a:solidFill>
-                <a:miter lim="800000"/>
-                <a:headEnd/>
-                <a:tailEnd/>
-              </a14:hiddenLine>
-            </a:ext>
-            <a:ext uri="{AF507438-7753-43E0-B8FC-AC1667EBCBE1}">
-              <a14:hiddenEffects xmlns:a14="http://schemas.microsoft.com/office/drawing/2010/main">
-                <a:effectLst>
-                  <a:outerShdw dist="35921" dir="2700000" algn="ctr" rotWithShape="0">
-                    <a:schemeClr val="bg2"/>
-                  </a:outerShdw>
-                </a:effectLst>
-              </a14:hiddenEffects>
-            </a:ext>
-          </a:extLst>
-        </p:spPr>
-      </p:pic>
     </p:spTree>
     <p:extLst>
       <p:ext uri="{BB962C8B-B14F-4D97-AF65-F5344CB8AC3E}">
-        <p14:creationId xmlns:p14="http://schemas.microsoft.com/office/powerpoint/2010/main" val="3279153854"/>
+        <p14:creationId xmlns:p14="http://schemas.microsoft.com/office/powerpoint/2010/main" val="602118267"/>
       </p:ext>
     </p:extLst>
   </p:cSld>
@@ -4066,7 +4011,7 @@
         </p:nvSpPr>
         <p:spPr>
           <a:xfrm>
-            <a:off x="304800" y="3124200"/>
+            <a:off x="304800" y="1860042"/>
             <a:ext cx="304800" cy="121158"/>
           </a:xfrm>
           <a:prstGeom prst="rightArrow">
@@ -4100,7 +4045,7 @@
       </p:sp>
       <p:pic>
         <p:nvPicPr>
-          <p:cNvPr id="10242" name="Picture 2"/>
+          <p:cNvPr id="9218" name="Picture 2"/>
           <p:cNvPicPr>
             <a:picLocks noChangeAspect="1" noChangeArrowheads="1"/>
           </p:cNvPicPr>
@@ -4121,8 +4066,8 @@
         </p:blipFill>
         <p:spPr bwMode="auto">
           <a:xfrm>
-            <a:off x="2590800" y="1547812"/>
-            <a:ext cx="8478837" cy="4219575"/>
+            <a:off x="2743200" y="1219200"/>
+            <a:ext cx="8469313" cy="3867150"/>
           </a:xfrm>
           <a:prstGeom prst="rect">
             <a:avLst/>
@@ -4162,10 +4107,72 @@
           </a:extLst>
         </p:spPr>
       </p:pic>
+      <p:pic>
+        <p:nvPicPr>
+          <p:cNvPr id="6" name="Picture 3"/>
+          <p:cNvPicPr>
+            <a:picLocks noChangeAspect="1" noChangeArrowheads="1"/>
+          </p:cNvPicPr>
+          <p:nvPr/>
+        </p:nvPicPr>
+        <p:blipFill rotWithShape="1">
+          <a:blip r:embed="rId4">
+            <a:extLst>
+              <a:ext uri="{28A0092B-C50C-407E-A947-70E740481C1C}">
+                <a14:useLocalDpi xmlns:a14="http://schemas.microsoft.com/office/drawing/2010/main" val="0"/>
+              </a:ext>
+            </a:extLst>
+          </a:blip>
+          <a:srcRect l="-1" t="11488" r="61838" b="3726"/>
+          <a:stretch/>
+        </p:blipFill>
+        <p:spPr bwMode="auto">
+          <a:xfrm>
+            <a:off x="228600" y="4038600"/>
+            <a:ext cx="2743200" cy="2624667"/>
+          </a:xfrm>
+          <a:prstGeom prst="rect">
+            <a:avLst/>
+          </a:prstGeom>
+          <a:noFill/>
+          <a:ln>
+            <a:noFill/>
+          </a:ln>
+          <a:effectLst/>
+          <a:extLst>
+            <a:ext uri="{909E8E84-426E-40DD-AFC4-6F175D3DCCD1}">
+              <a14:hiddenFill xmlns:a14="http://schemas.microsoft.com/office/drawing/2010/main">
+                <a:solidFill>
+                  <a:schemeClr val="accent1"/>
+                </a:solidFill>
+              </a14:hiddenFill>
+            </a:ext>
+            <a:ext uri="{91240B29-F687-4F45-9708-019B960494DF}">
+              <a14:hiddenLine xmlns:a14="http://schemas.microsoft.com/office/drawing/2010/main" w="9525">
+                <a:solidFill>
+                  <a:schemeClr val="tx1"/>
+                </a:solidFill>
+                <a:miter lim="800000"/>
+                <a:headEnd/>
+                <a:tailEnd/>
+              </a14:hiddenLine>
+            </a:ext>
+            <a:ext uri="{AF507438-7753-43E0-B8FC-AC1667EBCBE1}">
+              <a14:hiddenEffects xmlns:a14="http://schemas.microsoft.com/office/drawing/2010/main">
+                <a:effectLst>
+                  <a:outerShdw dist="35921" dir="2700000" algn="ctr" rotWithShape="0">
+                    <a:schemeClr val="bg2"/>
+                  </a:outerShdw>
+                </a:effectLst>
+              </a14:hiddenEffects>
+            </a:ext>
+          </a:extLst>
+        </p:spPr>
+      </p:pic>
     </p:spTree>
     <p:extLst>
       <p:ext uri="{BB962C8B-B14F-4D97-AF65-F5344CB8AC3E}">
-        <p14:creationId xmlns:p14="http://schemas.microsoft.com/office/powerpoint/2010/main" val="3532776013"/>
+        <p14:creationId xmlns:p14="http://schemas.microsoft.com/office/powerpoint/2010/main" val="3279153854"/>
       </p:ext>
     </p:extLst>
   </p:cSld>
@@ -4335,7 +4342,7 @@
       </p:sp>
       <p:pic>
         <p:nvPicPr>
-          <p:cNvPr id="11266" name="Picture 2"/>
+          <p:cNvPr id="10242" name="Picture 2"/>
           <p:cNvPicPr>
             <a:picLocks noChangeAspect="1" noChangeArrowheads="1"/>
           </p:cNvPicPr>
@@ -4356,8 +4363,8 @@
         </p:blipFill>
         <p:spPr bwMode="auto">
           <a:xfrm>
-            <a:off x="2667000" y="1431323"/>
-            <a:ext cx="8012113" cy="5285333"/>
+            <a:off x="2590800" y="1547812"/>
+            <a:ext cx="8478837" cy="4219575"/>
           </a:xfrm>
           <a:prstGeom prst="rect">
             <a:avLst/>
@@ -4400,7 +4407,7 @@
     </p:spTree>
     <p:extLst>
       <p:ext uri="{BB962C8B-B14F-4D97-AF65-F5344CB8AC3E}">
-        <p14:creationId xmlns:p14="http://schemas.microsoft.com/office/powerpoint/2010/main" val="2233021661"/>
+        <p14:creationId xmlns:p14="http://schemas.microsoft.com/office/powerpoint/2010/main" val="3532776013"/>
       </p:ext>
     </p:extLst>
   </p:cSld>
@@ -4536,7 +4543,7 @@
         </p:nvSpPr>
         <p:spPr>
           <a:xfrm>
-            <a:off x="304800" y="3307842"/>
+            <a:off x="304800" y="3124200"/>
             <a:ext cx="304800" cy="121158"/>
           </a:xfrm>
           <a:prstGeom prst="rightArrow">
@@ -4570,7 +4577,7 @@
       </p:sp>
       <p:pic>
         <p:nvPicPr>
-          <p:cNvPr id="12290" name="Picture 2"/>
+          <p:cNvPr id="11266" name="Picture 2"/>
           <p:cNvPicPr>
             <a:picLocks noChangeAspect="1" noChangeArrowheads="1"/>
           </p:cNvPicPr>
@@ -4591,8 +4598,8 @@
         </p:blipFill>
         <p:spPr bwMode="auto">
           <a:xfrm>
-            <a:off x="2819400" y="1676400"/>
-            <a:ext cx="8733804" cy="4157663"/>
+            <a:off x="2667000" y="1431323"/>
+            <a:ext cx="8012113" cy="5285333"/>
           </a:xfrm>
           <a:prstGeom prst="rect">
             <a:avLst/>
@@ -4635,7 +4642,7 @@
     </p:spTree>
     <p:extLst>
       <p:ext uri="{BB962C8B-B14F-4D97-AF65-F5344CB8AC3E}">
-        <p14:creationId xmlns:p14="http://schemas.microsoft.com/office/powerpoint/2010/main" val="1119289177"/>
+        <p14:creationId xmlns:p14="http://schemas.microsoft.com/office/powerpoint/2010/main" val="2233021661"/>
       </p:ext>
     </p:extLst>
   </p:cSld>
@@ -4771,7 +4778,7 @@
         </p:nvSpPr>
         <p:spPr>
           <a:xfrm>
-            <a:off x="304800" y="3505200"/>
+            <a:off x="304800" y="3307842"/>
             <a:ext cx="304800" cy="121158"/>
           </a:xfrm>
           <a:prstGeom prst="rightArrow">
@@ -4805,7 +4812,7 @@
       </p:sp>
       <p:pic>
         <p:nvPicPr>
-          <p:cNvPr id="13314" name="Picture 2"/>
+          <p:cNvPr id="12290" name="Picture 2"/>
           <p:cNvPicPr>
             <a:picLocks noChangeAspect="1" noChangeArrowheads="1"/>
           </p:cNvPicPr>
@@ -4826,8 +4833,8 @@
         </p:blipFill>
         <p:spPr bwMode="auto">
           <a:xfrm>
-            <a:off x="2362200" y="1295400"/>
-            <a:ext cx="7935913" cy="5495925"/>
+            <a:off x="2819400" y="1676400"/>
+            <a:ext cx="8733804" cy="4157663"/>
           </a:xfrm>
           <a:prstGeom prst="rect">
             <a:avLst/>
@@ -4870,7 +4877,7 @@
     </p:spTree>
     <p:extLst>
       <p:ext uri="{BB962C8B-B14F-4D97-AF65-F5344CB8AC3E}">
-        <p14:creationId xmlns:p14="http://schemas.microsoft.com/office/powerpoint/2010/main" val="3063792660"/>
+        <p14:creationId xmlns:p14="http://schemas.microsoft.com/office/powerpoint/2010/main" val="1119289177"/>
       </p:ext>
     </p:extLst>
   </p:cSld>
@@ -4936,7 +4943,7 @@
       </p:sp>
       <p:pic>
         <p:nvPicPr>
-          <p:cNvPr id="14338" name="Picture 2"/>
+          <p:cNvPr id="6146" name="Picture 2"/>
           <p:cNvPicPr>
             <a:picLocks noChangeAspect="1" noChangeArrowheads="1"/>
           </p:cNvPicPr>
@@ -4957,8 +4964,8 @@
         </p:blipFill>
         <p:spPr bwMode="auto">
           <a:xfrm>
-            <a:off x="540406" y="1600200"/>
-            <a:ext cx="10965794" cy="4284662"/>
+            <a:off x="609600" y="1447800"/>
+            <a:ext cx="1652954" cy="2209800"/>
           </a:xfrm>
           <a:prstGeom prst="rect">
             <a:avLst/>
@@ -4998,10 +5005,114 @@
           </a:extLst>
         </p:spPr>
       </p:pic>
+      <p:sp>
+        <p:nvSpPr>
+          <p:cNvPr id="3" name="Right Arrow 2"/>
+          <p:cNvSpPr/>
+          <p:nvPr/>
+        </p:nvSpPr>
+        <p:spPr>
+          <a:xfrm>
+            <a:off x="304800" y="3505200"/>
+            <a:ext cx="304800" cy="121158"/>
+          </a:xfrm>
+          <a:prstGeom prst="rightArrow">
+            <a:avLst/>
+          </a:prstGeom>
+        </p:spPr>
+        <p:style>
+          <a:lnRef idx="2">
+            <a:schemeClr val="accent2">
+              <a:shade val="50000"/>
+            </a:schemeClr>
+          </a:lnRef>
+          <a:fillRef idx="1">
+            <a:schemeClr val="accent2"/>
+          </a:fillRef>
+          <a:effectRef idx="0">
+            <a:schemeClr val="accent2"/>
+          </a:effectRef>
+          <a:fontRef idx="minor">
+            <a:schemeClr val="lt1"/>
+          </a:fontRef>
+        </p:style>
+        <p:txBody>
+          <a:bodyPr rtlCol="0" anchor="ctr"/>
+          <a:lstStyle/>
+          <a:p>
+            <a:pPr algn="ctr"/>
+            <a:endParaRPr lang="en-US"/>
+          </a:p>
+        </p:txBody>
+      </p:sp>
+      <p:pic>
+        <p:nvPicPr>
+          <p:cNvPr id="13314" name="Picture 2"/>
+          <p:cNvPicPr>
+            <a:picLocks noChangeAspect="1" noChangeArrowheads="1"/>
+          </p:cNvPicPr>
+          <p:nvPr/>
+        </p:nvPicPr>
+        <p:blipFill>
+          <a:blip r:embed="rId3">
+            <a:extLst>
+              <a:ext uri="{28A0092B-C50C-407E-A947-70E740481C1C}">
+                <a14:useLocalDpi xmlns:a14="http://schemas.microsoft.com/office/drawing/2010/main" val="0"/>
+              </a:ext>
+            </a:extLst>
+          </a:blip>
+          <a:srcRect/>
+          <a:stretch>
+            <a:fillRect/>
+          </a:stretch>
+        </p:blipFill>
+        <p:spPr bwMode="auto">
+          <a:xfrm>
+            <a:off x="2362200" y="1295400"/>
+            <a:ext cx="7935913" cy="5495925"/>
+          </a:xfrm>
+          <a:prstGeom prst="rect">
+            <a:avLst/>
+          </a:prstGeom>
+          <a:noFill/>
+          <a:ln>
+            <a:noFill/>
+          </a:ln>
+          <a:effectLst/>
+          <a:extLst>
+            <a:ext uri="{909E8E84-426E-40DD-AFC4-6F175D3DCCD1}">
+              <a14:hiddenFill xmlns:a14="http://schemas.microsoft.com/office/drawing/2010/main">
+                <a:solidFill>
+                  <a:schemeClr val="accent1"/>
+                </a:solidFill>
+              </a14:hiddenFill>
+            </a:ext>
+            <a:ext uri="{91240B29-F687-4F45-9708-019B960494DF}">
+              <a14:hiddenLine xmlns:a14="http://schemas.microsoft.com/office/drawing/2010/main" w="9525">
+                <a:solidFill>
+                  <a:schemeClr val="tx1"/>
+                </a:solidFill>
+                <a:miter lim="800000"/>
+                <a:headEnd/>
+                <a:tailEnd/>
+              </a14:hiddenLine>
+            </a:ext>
+            <a:ext uri="{AF507438-7753-43E0-B8FC-AC1667EBCBE1}">
+              <a14:hiddenEffects xmlns:a14="http://schemas.microsoft.com/office/drawing/2010/main">
+                <a:effectLst>
+                  <a:outerShdw dist="35921" dir="2700000" algn="ctr" rotWithShape="0">
+                    <a:schemeClr val="bg2"/>
+                  </a:outerShdw>
+                </a:effectLst>
+              </a14:hiddenEffects>
+            </a:ext>
+          </a:extLst>
+        </p:spPr>
+      </p:pic>
     </p:spTree>
     <p:extLst>
       <p:ext uri="{BB962C8B-B14F-4D97-AF65-F5344CB8AC3E}">
-        <p14:creationId xmlns:p14="http://schemas.microsoft.com/office/powerpoint/2010/main" val="847304419"/>
+        <p14:creationId xmlns:p14="http://schemas.microsoft.com/office/powerpoint/2010/main" val="3063792660"/>
       </p:ext>
     </p:extLst>
   </p:cSld>
@@ -5059,7 +5170,7 @@
           <a:p>
             <a:r>
               <a:rPr lang="en-US" sz="4000" b="1" dirty="0" smtClean="0"/>
-              <a:t>Outlier Removal</a:t>
+              <a:t>Data Cleaning</a:t>
             </a:r>
             <a:endParaRPr lang="en-US" sz="4000" b="1" dirty="0"/>
           </a:p>
@@ -5067,7 +5178,7 @@
       </p:sp>
       <p:pic>
         <p:nvPicPr>
-          <p:cNvPr id="15362" name="Picture 2"/>
+          <p:cNvPr id="14338" name="Picture 2"/>
           <p:cNvPicPr>
             <a:picLocks noChangeAspect="1" noChangeArrowheads="1"/>
           </p:cNvPicPr>
@@ -5088,8 +5199,8 @@
         </p:blipFill>
         <p:spPr bwMode="auto">
           <a:xfrm>
-            <a:off x="414562" y="1295400"/>
-            <a:ext cx="8314876" cy="5029200"/>
+            <a:off x="540406" y="1600200"/>
+            <a:ext cx="10965794" cy="4284662"/>
           </a:xfrm>
           <a:prstGeom prst="rect">
             <a:avLst/>
@@ -5129,56 +5240,10 @@
           </a:extLst>
         </p:spPr>
       </p:pic>
-      <p:sp>
-        <p:nvSpPr>
-          <p:cNvPr id="4" name="Oval 3"/>
-          <p:cNvSpPr/>
-          <p:nvPr/>
-        </p:nvSpPr>
-        <p:spPr>
-          <a:xfrm>
-            <a:off x="1676400" y="3429000"/>
-            <a:ext cx="914400" cy="228600"/>
-          </a:xfrm>
-          <a:prstGeom prst="ellipse">
-            <a:avLst/>
-          </a:prstGeom>
-          <a:noFill/>
-          <a:ln>
-            <a:solidFill>
-              <a:srgbClr val="FF0000"/>
-            </a:solidFill>
-          </a:ln>
-        </p:spPr>
-        <p:style>
-          <a:lnRef idx="2">
-            <a:schemeClr val="accent1">
-              <a:shade val="50000"/>
-            </a:schemeClr>
-          </a:lnRef>
-          <a:fillRef idx="1">
-            <a:schemeClr val="accent1"/>
-          </a:fillRef>
-          <a:effectRef idx="0">
-            <a:schemeClr val="accent1"/>
-          </a:effectRef>
-          <a:fontRef idx="minor">
-            <a:schemeClr val="lt1"/>
-          </a:fontRef>
-        </p:style>
-        <p:txBody>
-          <a:bodyPr rtlCol="0" anchor="ctr"/>
-          <a:lstStyle/>
-          <a:p>
-            <a:pPr algn="ctr"/>
-            <a:endParaRPr lang="en-US"/>
-          </a:p>
-        </p:txBody>
-      </p:sp>
     </p:spTree>
     <p:extLst>
       <p:ext uri="{BB962C8B-B14F-4D97-AF65-F5344CB8AC3E}">
-        <p14:creationId xmlns:p14="http://schemas.microsoft.com/office/powerpoint/2010/main" val="2586871350"/>
+        <p14:creationId xmlns:p14="http://schemas.microsoft.com/office/powerpoint/2010/main" val="847304419"/>
       </p:ext>
     </p:extLst>
   </p:cSld>
@@ -5224,7 +5289,7 @@
         </p:nvSpPr>
         <p:spPr>
           <a:xfrm>
-            <a:off x="2362200" y="152400"/>
+            <a:off x="2362200" y="2667000"/>
             <a:ext cx="4419600" cy="1470025"/>
           </a:xfrm>
         </p:spPr>
@@ -5235,79 +5300,17 @@
           <a:lstStyle/>
           <a:p>
             <a:r>
-              <a:rPr lang="en-US" sz="4000" b="1" dirty="0" smtClean="0"/>
+              <a:rPr lang="en-US" sz="6600" b="1" dirty="0" smtClean="0"/>
               <a:t>Outlier Removal</a:t>
             </a:r>
-            <a:endParaRPr lang="en-US" sz="4000" b="1" dirty="0"/>
-          </a:p>
-        </p:txBody>
-      </p:sp>
-      <p:pic>
-        <p:nvPicPr>
-          <p:cNvPr id="16386" name="Picture 2"/>
-          <p:cNvPicPr>
-            <a:picLocks noChangeAspect="1" noChangeArrowheads="1"/>
-          </p:cNvPicPr>
-          <p:nvPr/>
-        </p:nvPicPr>
-        <p:blipFill rotWithShape="1">
-          <a:blip r:embed="rId2">
-            <a:extLst>
-              <a:ext uri="{28A0092B-C50C-407E-A947-70E740481C1C}">
-                <a14:useLocalDpi xmlns:a14="http://schemas.microsoft.com/office/drawing/2010/main" val="0"/>
-              </a:ext>
-            </a:extLst>
-          </a:blip>
-          <a:srcRect r="25126"/>
-          <a:stretch/>
-        </p:blipFill>
-        <p:spPr bwMode="auto">
-          <a:xfrm>
-            <a:off x="468313" y="1371600"/>
-            <a:ext cx="8207375" cy="4822219"/>
-          </a:xfrm>
-          <a:prstGeom prst="rect">
-            <a:avLst/>
-          </a:prstGeom>
-          <a:noFill/>
-          <a:ln>
-            <a:noFill/>
-          </a:ln>
-          <a:effectLst/>
-          <a:extLst>
-            <a:ext uri="{909E8E84-426E-40DD-AFC4-6F175D3DCCD1}">
-              <a14:hiddenFill xmlns:a14="http://schemas.microsoft.com/office/drawing/2010/main">
-                <a:solidFill>
-                  <a:schemeClr val="accent1"/>
-                </a:solidFill>
-              </a14:hiddenFill>
-            </a:ext>
-            <a:ext uri="{91240B29-F687-4F45-9708-019B960494DF}">
-              <a14:hiddenLine xmlns:a14="http://schemas.microsoft.com/office/drawing/2010/main" w="9525">
-                <a:solidFill>
-                  <a:schemeClr val="tx1"/>
-                </a:solidFill>
-                <a:miter lim="800000"/>
-                <a:headEnd/>
-                <a:tailEnd/>
-              </a14:hiddenLine>
-            </a:ext>
-            <a:ext uri="{AF507438-7753-43E0-B8FC-AC1667EBCBE1}">
-              <a14:hiddenEffects xmlns:a14="http://schemas.microsoft.com/office/drawing/2010/main">
-                <a:effectLst>
-                  <a:outerShdw dist="35921" dir="2700000" algn="ctr" rotWithShape="0">
-                    <a:schemeClr val="bg2"/>
-                  </a:outerShdw>
-                </a:effectLst>
-              </a14:hiddenEffects>
-            </a:ext>
-          </a:extLst>
-        </p:spPr>
-      </p:pic>
+            <a:endParaRPr lang="en-US" sz="6600" b="1" dirty="0"/>
+          </a:p>
+        </p:txBody>
+      </p:sp>
     </p:spTree>
     <p:extLst>
       <p:ext uri="{BB962C8B-B14F-4D97-AF65-F5344CB8AC3E}">
-        <p14:creationId xmlns:p14="http://schemas.microsoft.com/office/powerpoint/2010/main" val="3397363562"/>
+        <p14:creationId xmlns:p14="http://schemas.microsoft.com/office/powerpoint/2010/main" val="3407756941"/>
       </p:ext>
     </p:extLst>
   </p:cSld>
@@ -5440,13 +5443,13 @@
       </p:sp>
       <p:pic>
         <p:nvPicPr>
-          <p:cNvPr id="17410" name="Picture 2"/>
+          <p:cNvPr id="15362" name="Picture 2"/>
           <p:cNvPicPr>
             <a:picLocks noChangeAspect="1" noChangeArrowheads="1"/>
           </p:cNvPicPr>
           <p:nvPr/>
         </p:nvPicPr>
-        <p:blipFill rotWithShape="1">
+        <p:blipFill>
           <a:blip r:embed="rId2">
             <a:extLst>
               <a:ext uri="{28A0092B-C50C-407E-A947-70E740481C1C}">
@@ -5454,13 +5457,15 @@
               </a:ext>
             </a:extLst>
           </a:blip>
-          <a:srcRect r="14777"/>
-          <a:stretch/>
+          <a:srcRect/>
+          <a:stretch>
+            <a:fillRect/>
+          </a:stretch>
         </p:blipFill>
         <p:spPr bwMode="auto">
           <a:xfrm>
-            <a:off x="384810" y="1600200"/>
-            <a:ext cx="8374380" cy="4459287"/>
+            <a:off x="414562" y="1295400"/>
+            <a:ext cx="8314876" cy="5029200"/>
           </a:xfrm>
           <a:prstGeom prst="rect">
             <a:avLst/>
@@ -5500,10 +5505,56 @@
           </a:extLst>
         </p:spPr>
       </p:pic>
+      <p:sp>
+        <p:nvSpPr>
+          <p:cNvPr id="4" name="Oval 3"/>
+          <p:cNvSpPr/>
+          <p:nvPr/>
+        </p:nvSpPr>
+        <p:spPr>
+          <a:xfrm>
+            <a:off x="1676400" y="3429000"/>
+            <a:ext cx="914400" cy="228600"/>
+          </a:xfrm>
+          <a:prstGeom prst="ellipse">
+            <a:avLst/>
+          </a:prstGeom>
+          <a:noFill/>
+          <a:ln>
+            <a:solidFill>
+              <a:srgbClr val="FF0000"/>
+            </a:solidFill>
+          </a:ln>
+        </p:spPr>
+        <p:style>
+          <a:lnRef idx="2">
+            <a:schemeClr val="accent1">
+              <a:shade val="50000"/>
+            </a:schemeClr>
+          </a:lnRef>
+          <a:fillRef idx="1">
+            <a:schemeClr val="accent1"/>
+          </a:fillRef>
+          <a:effectRef idx="0">
+            <a:schemeClr val="accent1"/>
+          </a:effectRef>
+          <a:fontRef idx="minor">
+            <a:schemeClr val="lt1"/>
+          </a:fontRef>
+        </p:style>
+        <p:txBody>
+          <a:bodyPr rtlCol="0" anchor="ctr"/>
+          <a:lstStyle/>
+          <a:p>
+            <a:pPr algn="ctr"/>
+            <a:endParaRPr lang="en-US"/>
+          </a:p>
+        </p:txBody>
+      </p:sp>
     </p:spTree>
     <p:extLst>
       <p:ext uri="{BB962C8B-B14F-4D97-AF65-F5344CB8AC3E}">
-        <p14:creationId xmlns:p14="http://schemas.microsoft.com/office/powerpoint/2010/main" val="528441819"/>
+        <p14:creationId xmlns:p14="http://schemas.microsoft.com/office/powerpoint/2010/main" val="2586871350"/>
       </p:ext>
     </p:extLst>
   </p:cSld>
@@ -5549,8 +5600,8 @@
         </p:nvSpPr>
         <p:spPr>
           <a:xfrm>
-            <a:off x="1524000" y="130175"/>
-            <a:ext cx="6096000" cy="1470025"/>
+            <a:off x="2362200" y="152400"/>
+            <a:ext cx="4419600" cy="1470025"/>
           </a:xfrm>
         </p:spPr>
         <p:txBody>
@@ -5561,7 +5612,7 @@
           <a:p>
             <a:r>
               <a:rPr lang="en-US" sz="4000" b="1" dirty="0" smtClean="0"/>
-              <a:t>Data Analysis and Insights</a:t>
+              <a:t>Outlier Removal</a:t>
             </a:r>
             <a:endParaRPr lang="en-US" sz="4000" b="1" dirty="0"/>
           </a:p>
@@ -5569,13 +5620,13 @@
       </p:sp>
       <p:pic>
         <p:nvPicPr>
-          <p:cNvPr id="18435" name="Picture 3"/>
+          <p:cNvPr id="16386" name="Picture 2"/>
           <p:cNvPicPr>
             <a:picLocks noChangeAspect="1" noChangeArrowheads="1"/>
           </p:cNvPicPr>
           <p:nvPr/>
         </p:nvPicPr>
-        <p:blipFill>
+        <p:blipFill rotWithShape="1">
           <a:blip r:embed="rId2">
             <a:extLst>
               <a:ext uri="{28A0092B-C50C-407E-A947-70E740481C1C}">
@@ -5583,15 +5634,13 @@
               </a:ext>
             </a:extLst>
           </a:blip>
-          <a:srcRect/>
-          <a:stretch>
-            <a:fillRect/>
-          </a:stretch>
+          <a:srcRect r="25126"/>
+          <a:stretch/>
         </p:blipFill>
         <p:spPr bwMode="auto">
           <a:xfrm>
-            <a:off x="4724400" y="1371600"/>
-            <a:ext cx="3962400" cy="5245202"/>
+            <a:off x="468313" y="1371600"/>
+            <a:ext cx="8207375" cy="4822219"/>
           </a:xfrm>
           <a:prstGeom prst="rect">
             <a:avLst/>
@@ -5631,193 +5680,10 @@
           </a:extLst>
         </p:spPr>
       </p:pic>
-      <p:pic>
-        <p:nvPicPr>
-          <p:cNvPr id="18436" name="Picture 4"/>
-          <p:cNvPicPr>
-            <a:picLocks noChangeAspect="1" noChangeArrowheads="1"/>
-          </p:cNvPicPr>
-          <p:nvPr/>
-        </p:nvPicPr>
-        <p:blipFill>
-          <a:blip r:embed="rId3">
-            <a:extLst>
-              <a:ext uri="{28A0092B-C50C-407E-A947-70E740481C1C}">
-                <a14:useLocalDpi xmlns:a14="http://schemas.microsoft.com/office/drawing/2010/main" val="0"/>
-              </a:ext>
-            </a:extLst>
-          </a:blip>
-          <a:srcRect/>
-          <a:stretch>
-            <a:fillRect/>
-          </a:stretch>
-        </p:blipFill>
-        <p:spPr bwMode="auto">
-          <a:xfrm>
-            <a:off x="4996331" y="6172200"/>
-            <a:ext cx="3713123" cy="600652"/>
-          </a:xfrm>
-          <a:prstGeom prst="rect">
-            <a:avLst/>
-          </a:prstGeom>
-          <a:noFill/>
-          <a:ln>
-            <a:noFill/>
-          </a:ln>
-          <a:effectLst/>
-          <a:extLst>
-            <a:ext uri="{909E8E84-426E-40DD-AFC4-6F175D3DCCD1}">
-              <a14:hiddenFill xmlns:a14="http://schemas.microsoft.com/office/drawing/2010/main">
-                <a:solidFill>
-                  <a:schemeClr val="accent1"/>
-                </a:solidFill>
-              </a14:hiddenFill>
-            </a:ext>
-            <a:ext uri="{91240B29-F687-4F45-9708-019B960494DF}">
-              <a14:hiddenLine xmlns:a14="http://schemas.microsoft.com/office/drawing/2010/main" w="9525">
-                <a:solidFill>
-                  <a:schemeClr val="tx1"/>
-                </a:solidFill>
-                <a:miter lim="800000"/>
-                <a:headEnd/>
-                <a:tailEnd/>
-              </a14:hiddenLine>
-            </a:ext>
-            <a:ext uri="{AF507438-7753-43E0-B8FC-AC1667EBCBE1}">
-              <a14:hiddenEffects xmlns:a14="http://schemas.microsoft.com/office/drawing/2010/main">
-                <a:effectLst>
-                  <a:outerShdw dist="35921" dir="2700000" algn="ctr" rotWithShape="0">
-                    <a:schemeClr val="bg2"/>
-                  </a:outerShdw>
-                </a:effectLst>
-              </a14:hiddenEffects>
-            </a:ext>
-          </a:extLst>
-        </p:spPr>
-      </p:pic>
-      <p:sp>
-        <p:nvSpPr>
-          <p:cNvPr id="3" name="Rectangle 2"/>
-          <p:cNvSpPr/>
-          <p:nvPr/>
-        </p:nvSpPr>
-        <p:spPr>
-          <a:xfrm>
-            <a:off x="838200" y="1523999"/>
-            <a:ext cx="3505200" cy="4247317"/>
-          </a:xfrm>
-          <a:prstGeom prst="rect">
-            <a:avLst/>
-          </a:prstGeom>
-        </p:spPr>
-        <p:txBody>
-          <a:bodyPr wrap="square">
-            <a:spAutoFit/>
-          </a:bodyPr>
-          <a:lstStyle/>
-          <a:p>
-            <a:r>
-              <a:rPr lang="en-US" b="1" dirty="0"/>
-              <a:t>Insights</a:t>
-            </a:r>
-            <a:r>
-              <a:rPr lang="en-US" dirty="0" smtClean="0"/>
-              <a:t>:</a:t>
-            </a:r>
-          </a:p>
-          <a:p>
-            <a:pPr marL="285750" indent="-285750">
-              <a:buFont typeface="Arial" panose="020B0604020202020204" pitchFamily="34" charset="0"/>
-              <a:buChar char="•"/>
-            </a:pPr>
-            <a:endParaRPr lang="en-US" dirty="0"/>
-          </a:p>
-          <a:p>
-            <a:pPr marL="285750" indent="-285750">
-              <a:buFont typeface="Arial" panose="020B0604020202020204" pitchFamily="34" charset="0"/>
-              <a:buChar char="•"/>
-            </a:pPr>
-            <a:r>
-              <a:rPr lang="en-US" dirty="0" smtClean="0"/>
-              <a:t>The </a:t>
-            </a:r>
-            <a:r>
-              <a:rPr lang="en-US" dirty="0"/>
-              <a:t>most amount of </a:t>
-            </a:r>
-            <a:r>
-              <a:rPr lang="en-US" dirty="0" err="1"/>
-              <a:t>resturants</a:t>
-            </a:r>
-            <a:r>
-              <a:rPr lang="en-US" dirty="0"/>
-              <a:t> associated with </a:t>
-            </a:r>
-            <a:r>
-              <a:rPr lang="en-US" dirty="0" err="1"/>
-              <a:t>zomato</a:t>
-            </a:r>
-            <a:r>
-              <a:rPr lang="en-US" dirty="0"/>
-              <a:t> are in Delhi NCR, Mumbai and </a:t>
-            </a:r>
-            <a:r>
-              <a:rPr lang="en-US" dirty="0" smtClean="0"/>
-              <a:t>Bengaluru</a:t>
-            </a:r>
-          </a:p>
-          <a:p>
-            <a:pPr marL="285750" indent="-285750">
-              <a:buFont typeface="Arial" panose="020B0604020202020204" pitchFamily="34" charset="0"/>
-              <a:buChar char="•"/>
-            </a:pPr>
-            <a:endParaRPr lang="en-US" dirty="0"/>
-          </a:p>
-          <a:p>
-            <a:pPr marL="285750" indent="-285750">
-              <a:buFont typeface="Arial" panose="020B0604020202020204" pitchFamily="34" charset="0"/>
-              <a:buChar char="•"/>
-            </a:pPr>
-            <a:r>
-              <a:rPr lang="en-US" dirty="0" smtClean="0"/>
-              <a:t>There are very less amount of highly rated </a:t>
-            </a:r>
-            <a:r>
-              <a:rPr lang="en-US" dirty="0" err="1" smtClean="0"/>
-              <a:t>resturants</a:t>
-            </a:r>
-            <a:r>
-              <a:rPr lang="en-US" dirty="0" smtClean="0"/>
-              <a:t> associated with </a:t>
-            </a:r>
-            <a:r>
-              <a:rPr lang="en-US" dirty="0" err="1" smtClean="0"/>
-              <a:t>zomato</a:t>
-            </a:r>
-            <a:r>
-              <a:rPr lang="en-US" dirty="0" smtClean="0"/>
-              <a:t> in popular cities like Kanpur, Goa, Agra, Bhopal. So, these cities may be ideal for opening a </a:t>
-            </a:r>
-            <a:r>
-              <a:rPr lang="en-US" dirty="0" err="1" smtClean="0"/>
-              <a:t>resturant</a:t>
-            </a:r>
-            <a:r>
-              <a:rPr lang="en-US" dirty="0" smtClean="0"/>
-              <a:t> and getting associated with </a:t>
-            </a:r>
-            <a:r>
-              <a:rPr lang="en-US" dirty="0" err="1" smtClean="0"/>
-              <a:t>zomato</a:t>
-            </a:r>
-            <a:endParaRPr lang="en-US" dirty="0"/>
-          </a:p>
-        </p:txBody>
-      </p:sp>
     </p:spTree>
     <p:extLst>
       <p:ext uri="{BB962C8B-B14F-4D97-AF65-F5344CB8AC3E}">
-        <p14:creationId xmlns:p14="http://schemas.microsoft.com/office/powerpoint/2010/main" val="3517843514"/>
+        <p14:creationId xmlns:p14="http://schemas.microsoft.com/office/powerpoint/2010/main" val="3397363562"/>
       </p:ext>
     </p:extLst>
   </p:cSld>
@@ -5863,8 +5729,8 @@
         </p:nvSpPr>
         <p:spPr>
           <a:xfrm>
-            <a:off x="1524000" y="130175"/>
-            <a:ext cx="6096000" cy="1470025"/>
+            <a:off x="2362200" y="152400"/>
+            <a:ext cx="4419600" cy="1470025"/>
           </a:xfrm>
         </p:spPr>
         <p:txBody>
@@ -5875,7 +5741,7 @@
           <a:p>
             <a:r>
               <a:rPr lang="en-US" sz="4000" b="1" dirty="0" smtClean="0"/>
-              <a:t>Data Analysis and Insights</a:t>
+              <a:t>Outlier Removal</a:t>
             </a:r>
             <a:endParaRPr lang="en-US" sz="4000" b="1" dirty="0"/>
           </a:p>
@@ -5883,13 +5749,13 @@
       </p:sp>
       <p:pic>
         <p:nvPicPr>
-          <p:cNvPr id="19458" name="Picture 2"/>
+          <p:cNvPr id="17410" name="Picture 2"/>
           <p:cNvPicPr>
             <a:picLocks noChangeAspect="1" noChangeArrowheads="1"/>
           </p:cNvPicPr>
           <p:nvPr/>
         </p:nvPicPr>
-        <p:blipFill>
+        <p:blipFill rotWithShape="1">
           <a:blip r:embed="rId2">
             <a:extLst>
               <a:ext uri="{28A0092B-C50C-407E-A947-70E740481C1C}">
@@ -5897,15 +5763,13 @@
               </a:ext>
             </a:extLst>
           </a:blip>
-          <a:srcRect/>
-          <a:stretch>
-            <a:fillRect/>
-          </a:stretch>
+          <a:srcRect r="14777"/>
+          <a:stretch/>
         </p:blipFill>
         <p:spPr bwMode="auto">
           <a:xfrm>
-            <a:off x="4572000" y="1575036"/>
-            <a:ext cx="4262437" cy="4216163"/>
+            <a:off x="384810" y="1600200"/>
+            <a:ext cx="8374380" cy="4459287"/>
           </a:xfrm>
           <a:prstGeom prst="rect">
             <a:avLst/>
@@ -5945,105 +5809,10 @@
           </a:extLst>
         </p:spPr>
       </p:pic>
-      <p:sp>
-        <p:nvSpPr>
-          <p:cNvPr id="4" name="Rectangle 3"/>
-          <p:cNvSpPr/>
-          <p:nvPr/>
-        </p:nvSpPr>
-        <p:spPr>
-          <a:xfrm>
-            <a:off x="457200" y="1938278"/>
-            <a:ext cx="3962400" cy="2862322"/>
-          </a:xfrm>
-          <a:prstGeom prst="rect">
-            <a:avLst/>
-          </a:prstGeom>
-        </p:spPr>
-        <p:txBody>
-          <a:bodyPr wrap="square">
-            <a:spAutoFit/>
-          </a:bodyPr>
-          <a:lstStyle/>
-          <a:p>
-            <a:r>
-              <a:rPr lang="en-US" b="1" dirty="0" smtClean="0"/>
-              <a:t>Insights</a:t>
-            </a:r>
-            <a:r>
-              <a:rPr lang="en-US" dirty="0" smtClean="0"/>
-              <a:t>:</a:t>
-            </a:r>
-          </a:p>
-          <a:p>
-            <a:pPr marL="285750" indent="-285750">
-              <a:buFont typeface="Arial" panose="020B0604020202020204" pitchFamily="34" charset="0"/>
-              <a:buChar char="•"/>
-            </a:pPr>
-            <a:endParaRPr lang="en-US" dirty="0"/>
-          </a:p>
-          <a:p>
-            <a:pPr marL="285750" indent="-285750">
-              <a:buFont typeface="Arial" panose="020B0604020202020204" pitchFamily="34" charset="0"/>
-              <a:buChar char="•"/>
-            </a:pPr>
-            <a:r>
-              <a:rPr lang="en-US" dirty="0"/>
-              <a:t>Most of the restaurants are either not rated or have ratings less than </a:t>
-            </a:r>
-            <a:r>
-              <a:rPr lang="en-US" dirty="0" smtClean="0"/>
-              <a:t>2.5</a:t>
-            </a:r>
-          </a:p>
-          <a:p>
-            <a:pPr marL="285750" indent="-285750">
-              <a:buFont typeface="Arial" panose="020B0604020202020204" pitchFamily="34" charset="0"/>
-              <a:buChar char="•"/>
-            </a:pPr>
-            <a:endParaRPr lang="en-US" dirty="0"/>
-          </a:p>
-          <a:p>
-            <a:pPr marL="285750" indent="-285750">
-              <a:buFont typeface="Arial" panose="020B0604020202020204" pitchFamily="34" charset="0"/>
-              <a:buChar char="•"/>
-            </a:pPr>
-            <a:r>
-              <a:rPr lang="en-US" dirty="0" smtClean="0"/>
-              <a:t>The </a:t>
-            </a:r>
-            <a:r>
-              <a:rPr lang="en-US" dirty="0"/>
-              <a:t>ratings are normally </a:t>
-            </a:r>
-            <a:r>
-              <a:rPr lang="en-US" dirty="0" smtClean="0"/>
-              <a:t>distributed</a:t>
-            </a:r>
-          </a:p>
-          <a:p>
-            <a:pPr marL="285750" indent="-285750">
-              <a:buFont typeface="Arial" panose="020B0604020202020204" pitchFamily="34" charset="0"/>
-              <a:buChar char="•"/>
-            </a:pPr>
-            <a:endParaRPr lang="en-US" dirty="0"/>
-          </a:p>
-          <a:p>
-            <a:pPr marL="285750" indent="-285750">
-              <a:buFont typeface="Arial" panose="020B0604020202020204" pitchFamily="34" charset="0"/>
-              <a:buChar char="•"/>
-            </a:pPr>
-            <a:r>
-              <a:rPr lang="en-US" dirty="0"/>
-              <a:t>The average rating of a restaurant is around 3.5</a:t>
-            </a:r>
-          </a:p>
-        </p:txBody>
-      </p:sp>
     </p:spTree>
     <p:extLst>
       <p:ext uri="{BB962C8B-B14F-4D97-AF65-F5344CB8AC3E}">
-        <p14:creationId xmlns:p14="http://schemas.microsoft.com/office/powerpoint/2010/main" val="835170884"/>
+        <p14:creationId xmlns:p14="http://schemas.microsoft.com/office/powerpoint/2010/main" val="528441819"/>
       </p:ext>
     </p:extLst>
   </p:cSld>
@@ -6089,8 +5858,8 @@
         </p:nvSpPr>
         <p:spPr>
           <a:xfrm>
-            <a:off x="1524000" y="-152400"/>
-            <a:ext cx="6096000" cy="1470025"/>
+            <a:off x="2095500" y="2667000"/>
+            <a:ext cx="4953000" cy="1470025"/>
           </a:xfrm>
         </p:spPr>
         <p:txBody>
@@ -6100,81 +5869,17 @@
           <a:lstStyle/>
           <a:p>
             <a:r>
-              <a:rPr lang="en-US" sz="4000" b="1" dirty="0" smtClean="0"/>
+              <a:rPr lang="en-US" sz="6600" b="1" dirty="0" smtClean="0"/>
               <a:t>Data Analysis and Insights</a:t>
             </a:r>
-            <a:endParaRPr lang="en-US" sz="4000" b="1" dirty="0"/>
-          </a:p>
-        </p:txBody>
-      </p:sp>
-      <p:pic>
-        <p:nvPicPr>
-          <p:cNvPr id="20482" name="Picture 2"/>
-          <p:cNvPicPr>
-            <a:picLocks noChangeAspect="1" noChangeArrowheads="1"/>
-          </p:cNvPicPr>
-          <p:nvPr/>
-        </p:nvPicPr>
-        <p:blipFill>
-          <a:blip r:embed="rId2">
-            <a:extLst>
-              <a:ext uri="{28A0092B-C50C-407E-A947-70E740481C1C}">
-                <a14:useLocalDpi xmlns:a14="http://schemas.microsoft.com/office/drawing/2010/main" val="0"/>
-              </a:ext>
-            </a:extLst>
-          </a:blip>
-          <a:srcRect/>
-          <a:stretch>
-            <a:fillRect/>
-          </a:stretch>
-        </p:blipFill>
-        <p:spPr bwMode="auto">
-          <a:xfrm>
-            <a:off x="819150" y="990599"/>
-            <a:ext cx="7505700" cy="5528075"/>
-          </a:xfrm>
-          <a:prstGeom prst="rect">
-            <a:avLst/>
-          </a:prstGeom>
-          <a:noFill/>
-          <a:ln>
-            <a:noFill/>
-          </a:ln>
-          <a:effectLst/>
-          <a:extLst>
-            <a:ext uri="{909E8E84-426E-40DD-AFC4-6F175D3DCCD1}">
-              <a14:hiddenFill xmlns:a14="http://schemas.microsoft.com/office/drawing/2010/main">
-                <a:solidFill>
-                  <a:schemeClr val="accent1"/>
-                </a:solidFill>
-              </a14:hiddenFill>
-            </a:ext>
-            <a:ext uri="{91240B29-F687-4F45-9708-019B960494DF}">
-              <a14:hiddenLine xmlns:a14="http://schemas.microsoft.com/office/drawing/2010/main" w="9525">
-                <a:solidFill>
-                  <a:schemeClr val="tx1"/>
-                </a:solidFill>
-                <a:miter lim="800000"/>
-                <a:headEnd/>
-                <a:tailEnd/>
-              </a14:hiddenLine>
-            </a:ext>
-            <a:ext uri="{AF507438-7753-43E0-B8FC-AC1667EBCBE1}">
-              <a14:hiddenEffects xmlns:a14="http://schemas.microsoft.com/office/drawing/2010/main">
-                <a:effectLst>
-                  <a:outerShdw dist="35921" dir="2700000" algn="ctr" rotWithShape="0">
-                    <a:schemeClr val="bg2"/>
-                  </a:outerShdw>
-                </a:effectLst>
-              </a14:hiddenEffects>
-            </a:ext>
-          </a:extLst>
-        </p:spPr>
-      </p:pic>
+            <a:endParaRPr lang="en-US" sz="6600" b="1" dirty="0"/>
+          </a:p>
+        </p:txBody>
+      </p:sp>
     </p:spTree>
     <p:extLst>
       <p:ext uri="{BB962C8B-B14F-4D97-AF65-F5344CB8AC3E}">
-        <p14:creationId xmlns:p14="http://schemas.microsoft.com/office/powerpoint/2010/main" val="837620083"/>
+        <p14:creationId xmlns:p14="http://schemas.microsoft.com/office/powerpoint/2010/main" val="4170620409"/>
       </p:ext>
     </p:extLst>
   </p:cSld>
@@ -6220,7 +5925,7 @@
         </p:nvSpPr>
         <p:spPr>
           <a:xfrm>
-            <a:off x="1524000" y="-152400"/>
+            <a:off x="1524000" y="130175"/>
             <a:ext cx="6096000" cy="1470025"/>
           </a:xfrm>
         </p:spPr>
@@ -6240,7 +5945,7 @@
       </p:sp>
       <p:pic>
         <p:nvPicPr>
-          <p:cNvPr id="21506" name="Picture 2"/>
+          <p:cNvPr id="18435" name="Picture 3"/>
           <p:cNvPicPr>
             <a:picLocks noChangeAspect="1" noChangeArrowheads="1"/>
           </p:cNvPicPr>
@@ -6261,8 +5966,8 @@
         </p:blipFill>
         <p:spPr bwMode="auto">
           <a:xfrm>
-            <a:off x="528876" y="914400"/>
-            <a:ext cx="8086248" cy="5715000"/>
+            <a:off x="4724400" y="1371600"/>
+            <a:ext cx="3962400" cy="5245202"/>
           </a:xfrm>
           <a:prstGeom prst="rect">
             <a:avLst/>
@@ -6302,10 +6007,193 @@
           </a:extLst>
         </p:spPr>
       </p:pic>
+      <p:pic>
+        <p:nvPicPr>
+          <p:cNvPr id="18436" name="Picture 4"/>
+          <p:cNvPicPr>
+            <a:picLocks noChangeAspect="1" noChangeArrowheads="1"/>
+          </p:cNvPicPr>
+          <p:nvPr/>
+        </p:nvPicPr>
+        <p:blipFill>
+          <a:blip r:embed="rId3">
+            <a:extLst>
+              <a:ext uri="{28A0092B-C50C-407E-A947-70E740481C1C}">
+                <a14:useLocalDpi xmlns:a14="http://schemas.microsoft.com/office/drawing/2010/main" val="0"/>
+              </a:ext>
+            </a:extLst>
+          </a:blip>
+          <a:srcRect/>
+          <a:stretch>
+            <a:fillRect/>
+          </a:stretch>
+        </p:blipFill>
+        <p:spPr bwMode="auto">
+          <a:xfrm>
+            <a:off x="4996331" y="6172200"/>
+            <a:ext cx="3713123" cy="600652"/>
+          </a:xfrm>
+          <a:prstGeom prst="rect">
+            <a:avLst/>
+          </a:prstGeom>
+          <a:noFill/>
+          <a:ln>
+            <a:noFill/>
+          </a:ln>
+          <a:effectLst/>
+          <a:extLst>
+            <a:ext uri="{909E8E84-426E-40DD-AFC4-6F175D3DCCD1}">
+              <a14:hiddenFill xmlns:a14="http://schemas.microsoft.com/office/drawing/2010/main">
+                <a:solidFill>
+                  <a:schemeClr val="accent1"/>
+                </a:solidFill>
+              </a14:hiddenFill>
+            </a:ext>
+            <a:ext uri="{91240B29-F687-4F45-9708-019B960494DF}">
+              <a14:hiddenLine xmlns:a14="http://schemas.microsoft.com/office/drawing/2010/main" w="9525">
+                <a:solidFill>
+                  <a:schemeClr val="tx1"/>
+                </a:solidFill>
+                <a:miter lim="800000"/>
+                <a:headEnd/>
+                <a:tailEnd/>
+              </a14:hiddenLine>
+            </a:ext>
+            <a:ext uri="{AF507438-7753-43E0-B8FC-AC1667EBCBE1}">
+              <a14:hiddenEffects xmlns:a14="http://schemas.microsoft.com/office/drawing/2010/main">
+                <a:effectLst>
+                  <a:outerShdw dist="35921" dir="2700000" algn="ctr" rotWithShape="0">
+                    <a:schemeClr val="bg2"/>
+                  </a:outerShdw>
+                </a:effectLst>
+              </a14:hiddenEffects>
+            </a:ext>
+          </a:extLst>
+        </p:spPr>
+      </p:pic>
+      <p:sp>
+        <p:nvSpPr>
+          <p:cNvPr id="3" name="Rectangle 2"/>
+          <p:cNvSpPr/>
+          <p:nvPr/>
+        </p:nvSpPr>
+        <p:spPr>
+          <a:xfrm>
+            <a:off x="838200" y="1523999"/>
+            <a:ext cx="3505200" cy="4247317"/>
+          </a:xfrm>
+          <a:prstGeom prst="rect">
+            <a:avLst/>
+          </a:prstGeom>
+        </p:spPr>
+        <p:txBody>
+          <a:bodyPr wrap="square">
+            <a:spAutoFit/>
+          </a:bodyPr>
+          <a:lstStyle/>
+          <a:p>
+            <a:r>
+              <a:rPr lang="en-US" b="1" dirty="0"/>
+              <a:t>Insights</a:t>
+            </a:r>
+            <a:r>
+              <a:rPr lang="en-US" dirty="0" smtClean="0"/>
+              <a:t>:</a:t>
+            </a:r>
+          </a:p>
+          <a:p>
+            <a:pPr marL="285750" indent="-285750">
+              <a:buFont typeface="Arial" panose="020B0604020202020204" pitchFamily="34" charset="0"/>
+              <a:buChar char="•"/>
+            </a:pPr>
+            <a:endParaRPr lang="en-US" dirty="0"/>
+          </a:p>
+          <a:p>
+            <a:pPr marL="285750" indent="-285750">
+              <a:buFont typeface="Arial" panose="020B0604020202020204" pitchFamily="34" charset="0"/>
+              <a:buChar char="•"/>
+            </a:pPr>
+            <a:r>
+              <a:rPr lang="en-US" dirty="0" smtClean="0"/>
+              <a:t>The </a:t>
+            </a:r>
+            <a:r>
+              <a:rPr lang="en-US" dirty="0"/>
+              <a:t>most amount of </a:t>
+            </a:r>
+            <a:r>
+              <a:rPr lang="en-US" dirty="0" err="1"/>
+              <a:t>resturants</a:t>
+            </a:r>
+            <a:r>
+              <a:rPr lang="en-US" dirty="0"/>
+              <a:t> associated with </a:t>
+            </a:r>
+            <a:r>
+              <a:rPr lang="en-US" dirty="0" err="1"/>
+              <a:t>zomato</a:t>
+            </a:r>
+            <a:r>
+              <a:rPr lang="en-US" dirty="0"/>
+              <a:t> are in Delhi NCR, Mumbai and </a:t>
+            </a:r>
+            <a:r>
+              <a:rPr lang="en-US" dirty="0" smtClean="0"/>
+              <a:t>Bengaluru</a:t>
+            </a:r>
+          </a:p>
+          <a:p>
+            <a:pPr marL="285750" indent="-285750">
+              <a:buFont typeface="Arial" panose="020B0604020202020204" pitchFamily="34" charset="0"/>
+              <a:buChar char="•"/>
+            </a:pPr>
+            <a:endParaRPr lang="en-US" dirty="0"/>
+          </a:p>
+          <a:p>
+            <a:pPr marL="285750" indent="-285750">
+              <a:buFont typeface="Arial" panose="020B0604020202020204" pitchFamily="34" charset="0"/>
+              <a:buChar char="•"/>
+            </a:pPr>
+            <a:r>
+              <a:rPr lang="en-US" dirty="0" smtClean="0"/>
+              <a:t>There are very less amount of highly rated </a:t>
+            </a:r>
+            <a:r>
+              <a:rPr lang="en-US" dirty="0" err="1" smtClean="0"/>
+              <a:t>resturants</a:t>
+            </a:r>
+            <a:r>
+              <a:rPr lang="en-US" dirty="0" smtClean="0"/>
+              <a:t> associated with </a:t>
+            </a:r>
+            <a:r>
+              <a:rPr lang="en-US" dirty="0" err="1" smtClean="0"/>
+              <a:t>zomato</a:t>
+            </a:r>
+            <a:r>
+              <a:rPr lang="en-US" dirty="0" smtClean="0"/>
+              <a:t> in popular cities like Kanpur, Goa, Agra, Bhopal. So, these cities may be ideal for opening a </a:t>
+            </a:r>
+            <a:r>
+              <a:rPr lang="en-US" dirty="0" err="1" smtClean="0"/>
+              <a:t>resturant</a:t>
+            </a:r>
+            <a:r>
+              <a:rPr lang="en-US" dirty="0" smtClean="0"/>
+              <a:t> and getting associated with </a:t>
+            </a:r>
+            <a:r>
+              <a:rPr lang="en-US" dirty="0" err="1" smtClean="0"/>
+              <a:t>zomato</a:t>
+            </a:r>
+            <a:endParaRPr lang="en-US" dirty="0"/>
+          </a:p>
+        </p:txBody>
+      </p:sp>
     </p:spTree>
     <p:extLst>
       <p:ext uri="{BB962C8B-B14F-4D97-AF65-F5344CB8AC3E}">
-        <p14:creationId xmlns:p14="http://schemas.microsoft.com/office/powerpoint/2010/main" val="2291958702"/>
+        <p14:creationId xmlns:p14="http://schemas.microsoft.com/office/powerpoint/2010/main" val="3517843514"/>
       </p:ext>
     </p:extLst>
   </p:cSld>
@@ -6351,7 +6239,7 @@
         </p:nvSpPr>
         <p:spPr>
           <a:xfrm>
-            <a:off x="1524000" y="-152400"/>
+            <a:off x="1524000" y="130175"/>
             <a:ext cx="6096000" cy="1470025"/>
           </a:xfrm>
         </p:spPr>
@@ -6371,7 +6259,7 @@
       </p:sp>
       <p:pic>
         <p:nvPicPr>
-          <p:cNvPr id="22530" name="Picture 2"/>
+          <p:cNvPr id="19458" name="Picture 2"/>
           <p:cNvPicPr>
             <a:picLocks noChangeAspect="1" noChangeArrowheads="1"/>
           </p:cNvPicPr>
@@ -6392,8 +6280,8 @@
         </p:blipFill>
         <p:spPr bwMode="auto">
           <a:xfrm>
-            <a:off x="268883" y="1066800"/>
-            <a:ext cx="8606235" cy="4884737"/>
+            <a:off x="4572000" y="1575036"/>
+            <a:ext cx="4262437" cy="4216163"/>
           </a:xfrm>
           <a:prstGeom prst="rect">
             <a:avLst/>
@@ -6433,10 +6321,105 @@
           </a:extLst>
         </p:spPr>
       </p:pic>
+      <p:sp>
+        <p:nvSpPr>
+          <p:cNvPr id="4" name="Rectangle 3"/>
+          <p:cNvSpPr/>
+          <p:nvPr/>
+        </p:nvSpPr>
+        <p:spPr>
+          <a:xfrm>
+            <a:off x="457200" y="1938278"/>
+            <a:ext cx="3962400" cy="2862322"/>
+          </a:xfrm>
+          <a:prstGeom prst="rect">
+            <a:avLst/>
+          </a:prstGeom>
+        </p:spPr>
+        <p:txBody>
+          <a:bodyPr wrap="square">
+            <a:spAutoFit/>
+          </a:bodyPr>
+          <a:lstStyle/>
+          <a:p>
+            <a:r>
+              <a:rPr lang="en-US" b="1" dirty="0" smtClean="0"/>
+              <a:t>Insights</a:t>
+            </a:r>
+            <a:r>
+              <a:rPr lang="en-US" dirty="0" smtClean="0"/>
+              <a:t>:</a:t>
+            </a:r>
+          </a:p>
+          <a:p>
+            <a:pPr marL="285750" indent="-285750">
+              <a:buFont typeface="Arial" panose="020B0604020202020204" pitchFamily="34" charset="0"/>
+              <a:buChar char="•"/>
+            </a:pPr>
+            <a:endParaRPr lang="en-US" dirty="0"/>
+          </a:p>
+          <a:p>
+            <a:pPr marL="285750" indent="-285750">
+              <a:buFont typeface="Arial" panose="020B0604020202020204" pitchFamily="34" charset="0"/>
+              <a:buChar char="•"/>
+            </a:pPr>
+            <a:r>
+              <a:rPr lang="en-US" dirty="0"/>
+              <a:t>Most of the restaurants are either not rated or have ratings less than </a:t>
+            </a:r>
+            <a:r>
+              <a:rPr lang="en-US" dirty="0" smtClean="0"/>
+              <a:t>2.5</a:t>
+            </a:r>
+          </a:p>
+          <a:p>
+            <a:pPr marL="285750" indent="-285750">
+              <a:buFont typeface="Arial" panose="020B0604020202020204" pitchFamily="34" charset="0"/>
+              <a:buChar char="•"/>
+            </a:pPr>
+            <a:endParaRPr lang="en-US" dirty="0"/>
+          </a:p>
+          <a:p>
+            <a:pPr marL="285750" indent="-285750">
+              <a:buFont typeface="Arial" panose="020B0604020202020204" pitchFamily="34" charset="0"/>
+              <a:buChar char="•"/>
+            </a:pPr>
+            <a:r>
+              <a:rPr lang="en-US" dirty="0" smtClean="0"/>
+              <a:t>The </a:t>
+            </a:r>
+            <a:r>
+              <a:rPr lang="en-US" dirty="0"/>
+              <a:t>ratings are normally </a:t>
+            </a:r>
+            <a:r>
+              <a:rPr lang="en-US" dirty="0" smtClean="0"/>
+              <a:t>distributed</a:t>
+            </a:r>
+          </a:p>
+          <a:p>
+            <a:pPr marL="285750" indent="-285750">
+              <a:buFont typeface="Arial" panose="020B0604020202020204" pitchFamily="34" charset="0"/>
+              <a:buChar char="•"/>
+            </a:pPr>
+            <a:endParaRPr lang="en-US" dirty="0"/>
+          </a:p>
+          <a:p>
+            <a:pPr marL="285750" indent="-285750">
+              <a:buFont typeface="Arial" panose="020B0604020202020204" pitchFamily="34" charset="0"/>
+              <a:buChar char="•"/>
+            </a:pPr>
+            <a:r>
+              <a:rPr lang="en-US" dirty="0"/>
+              <a:t>The average rating of a restaurant is around 3.5</a:t>
+            </a:r>
+          </a:p>
+        </p:txBody>
+      </p:sp>
     </p:spTree>
     <p:extLst>
       <p:ext uri="{BB962C8B-B14F-4D97-AF65-F5344CB8AC3E}">
-        <p14:creationId xmlns:p14="http://schemas.microsoft.com/office/powerpoint/2010/main" val="3714003704"/>
+        <p14:creationId xmlns:p14="http://schemas.microsoft.com/office/powerpoint/2010/main" val="835170884"/>
       </p:ext>
     </p:extLst>
   </p:cSld>
@@ -6502,7 +6485,7 @@
       </p:sp>
       <p:pic>
         <p:nvPicPr>
-          <p:cNvPr id="23554" name="Picture 2"/>
+          <p:cNvPr id="20482" name="Picture 2"/>
           <p:cNvPicPr>
             <a:picLocks noChangeAspect="1" noChangeArrowheads="1"/>
           </p:cNvPicPr>
@@ -6523,8 +6506,8 @@
         </p:blipFill>
         <p:spPr bwMode="auto">
           <a:xfrm>
-            <a:off x="399396" y="990600"/>
-            <a:ext cx="8345209" cy="5410200"/>
+            <a:off x="819150" y="990599"/>
+            <a:ext cx="7505700" cy="5528075"/>
           </a:xfrm>
           <a:prstGeom prst="rect">
             <a:avLst/>
@@ -6567,7 +6550,7 @@
     </p:spTree>
     <p:extLst>
       <p:ext uri="{BB962C8B-B14F-4D97-AF65-F5344CB8AC3E}">
-        <p14:creationId xmlns:p14="http://schemas.microsoft.com/office/powerpoint/2010/main" val="1197279533"/>
+        <p14:creationId xmlns:p14="http://schemas.microsoft.com/office/powerpoint/2010/main" val="837620083"/>
       </p:ext>
     </p:extLst>
   </p:cSld>
@@ -6633,13 +6616,13 @@
       </p:sp>
       <p:pic>
         <p:nvPicPr>
-          <p:cNvPr id="24578" name="Picture 2"/>
+          <p:cNvPr id="21506" name="Picture 2"/>
           <p:cNvPicPr>
             <a:picLocks noChangeAspect="1" noChangeArrowheads="1"/>
           </p:cNvPicPr>
           <p:nvPr/>
         </p:nvPicPr>
-        <p:blipFill rotWithShape="1">
+        <p:blipFill>
           <a:blip r:embed="rId2">
             <a:extLst>
               <a:ext uri="{28A0092B-C50C-407E-A947-70E740481C1C}">
@@ -6647,13 +6630,15 @@
               </a:ext>
             </a:extLst>
           </a:blip>
-          <a:srcRect t="-157" r="31204" b="20891"/>
-          <a:stretch/>
+          <a:srcRect/>
+          <a:stretch>
+            <a:fillRect/>
+          </a:stretch>
         </p:blipFill>
         <p:spPr bwMode="auto">
           <a:xfrm>
-            <a:off x="1514561" y="1219201"/>
-            <a:ext cx="6114878" cy="4160108"/>
+            <a:off x="528876" y="914400"/>
+            <a:ext cx="8086248" cy="5715000"/>
           </a:xfrm>
           <a:prstGeom prst="rect">
             <a:avLst/>
@@ -6693,87 +6678,10 @@
           </a:extLst>
         </p:spPr>
       </p:pic>
-      <p:sp>
-        <p:nvSpPr>
-          <p:cNvPr id="3" name="Rectangle 2"/>
-          <p:cNvSpPr/>
-          <p:nvPr/>
-        </p:nvSpPr>
-        <p:spPr>
-          <a:xfrm>
-            <a:off x="495300" y="5352871"/>
-            <a:ext cx="8153400" cy="1200329"/>
-          </a:xfrm>
-          <a:prstGeom prst="rect">
-            <a:avLst/>
-          </a:prstGeom>
-        </p:spPr>
-        <p:txBody>
-          <a:bodyPr wrap="square">
-            <a:spAutoFit/>
-          </a:bodyPr>
-          <a:lstStyle/>
-          <a:p>
-            <a:r>
-              <a:rPr lang="en-US" b="1" dirty="0"/>
-              <a:t>Insights</a:t>
-            </a:r>
-            <a:r>
-              <a:rPr lang="en-US" dirty="0"/>
-              <a:t>:</a:t>
-            </a:r>
-          </a:p>
-          <a:p>
-            <a:pPr marL="285750" indent="-285750">
-              <a:buFont typeface="Arial" panose="020B0604020202020204" pitchFamily="34" charset="0"/>
-              <a:buChar char="•"/>
-            </a:pPr>
-            <a:r>
-              <a:rPr lang="en-US" dirty="0"/>
-              <a:t>There is a very good relation </a:t>
-            </a:r>
-            <a:r>
-              <a:rPr lang="en-US" dirty="0" err="1"/>
-              <a:t>betwen</a:t>
-            </a:r>
-            <a:r>
-              <a:rPr lang="en-US" dirty="0"/>
-              <a:t> rating and </a:t>
-            </a:r>
-            <a:r>
-              <a:rPr lang="en-US" dirty="0" err="1" smtClean="0"/>
-              <a:t>rating_type</a:t>
-            </a:r>
-            <a:endParaRPr lang="en-US" dirty="0" smtClean="0"/>
-          </a:p>
-          <a:p>
-            <a:pPr marL="285750" indent="-285750">
-              <a:buFont typeface="Arial" panose="020B0604020202020204" pitchFamily="34" charset="0"/>
-              <a:buChar char="•"/>
-            </a:pPr>
-            <a:r>
-              <a:rPr lang="en-US" dirty="0" smtClean="0"/>
-              <a:t>Page </a:t>
-            </a:r>
-            <a:r>
-              <a:rPr lang="en-US" dirty="0"/>
-              <a:t>number is has a negative correlation with rating, which means that as the page no. increases the rating of the </a:t>
-            </a:r>
-            <a:r>
-              <a:rPr lang="en-US" dirty="0" err="1"/>
-              <a:t>resturant</a:t>
-            </a:r>
-            <a:r>
-              <a:rPr lang="en-US" dirty="0"/>
-              <a:t> decreases</a:t>
-            </a:r>
-          </a:p>
-        </p:txBody>
-      </p:sp>
     </p:spTree>
     <p:extLst>
       <p:ext uri="{BB962C8B-B14F-4D97-AF65-F5344CB8AC3E}">
-        <p14:creationId xmlns:p14="http://schemas.microsoft.com/office/powerpoint/2010/main" val="2829814814"/>
+        <p14:creationId xmlns:p14="http://schemas.microsoft.com/office/powerpoint/2010/main" val="2291958702"/>
       </p:ext>
     </p:extLst>
   </p:cSld>
@@ -6819,7 +6727,7 @@
         </p:nvSpPr>
         <p:spPr>
           <a:xfrm>
-            <a:off x="1524000" y="130175"/>
+            <a:off x="1524000" y="-152400"/>
             <a:ext cx="6096000" cy="1470025"/>
           </a:xfrm>
         </p:spPr>
@@ -6831,7 +6739,7 @@
           <a:p>
             <a:r>
               <a:rPr lang="en-US" sz="4000" b="1" dirty="0" smtClean="0"/>
-              <a:t>Data Splitting</a:t>
+              <a:t>Data Analysis and Insights</a:t>
             </a:r>
             <a:endParaRPr lang="en-US" sz="4000" b="1" dirty="0"/>
           </a:p>
@@ -6839,13 +6747,13 @@
       </p:sp>
       <p:pic>
         <p:nvPicPr>
-          <p:cNvPr id="25602" name="Picture 2"/>
+          <p:cNvPr id="22530" name="Picture 2"/>
           <p:cNvPicPr>
             <a:picLocks noChangeAspect="1" noChangeArrowheads="1"/>
           </p:cNvPicPr>
           <p:nvPr/>
         </p:nvPicPr>
-        <p:blipFill rotWithShape="1">
+        <p:blipFill>
           <a:blip r:embed="rId2">
             <a:extLst>
               <a:ext uri="{28A0092B-C50C-407E-A947-70E740481C1C}">
@@ -6853,13 +6761,15 @@
               </a:ext>
             </a:extLst>
           </a:blip>
-          <a:srcRect r="27869"/>
-          <a:stretch/>
+          <a:srcRect/>
+          <a:stretch>
+            <a:fillRect/>
+          </a:stretch>
         </p:blipFill>
         <p:spPr bwMode="auto">
           <a:xfrm>
-            <a:off x="205616" y="1676400"/>
-            <a:ext cx="8616652" cy="4114800"/>
+            <a:off x="268883" y="1066800"/>
+            <a:ext cx="8606235" cy="4884737"/>
           </a:xfrm>
           <a:prstGeom prst="rect">
             <a:avLst/>
@@ -6902,7 +6812,7 @@
     </p:spTree>
     <p:extLst>
       <p:ext uri="{BB962C8B-B14F-4D97-AF65-F5344CB8AC3E}">
-        <p14:creationId xmlns:p14="http://schemas.microsoft.com/office/powerpoint/2010/main" val="2366035400"/>
+        <p14:creationId xmlns:p14="http://schemas.microsoft.com/office/powerpoint/2010/main" val="3714003704"/>
       </p:ext>
     </p:extLst>
   </p:cSld>
@@ -6960,7 +6870,7 @@
           <a:p>
             <a:r>
               <a:rPr lang="en-US" sz="4000" b="1" dirty="0" smtClean="0"/>
-              <a:t>Data Splitting</a:t>
+              <a:t>Data Analysis and Insights</a:t>
             </a:r>
             <a:endParaRPr lang="en-US" sz="4000" b="1" dirty="0"/>
           </a:p>
@@ -6968,7 +6878,7 @@
       </p:sp>
       <p:pic>
         <p:nvPicPr>
-          <p:cNvPr id="26626" name="Picture 2"/>
+          <p:cNvPr id="23554" name="Picture 2"/>
           <p:cNvPicPr>
             <a:picLocks noChangeAspect="1" noChangeArrowheads="1"/>
           </p:cNvPicPr>
@@ -6989,8 +6899,8 @@
         </p:blipFill>
         <p:spPr bwMode="auto">
           <a:xfrm>
-            <a:off x="1095712" y="1219200"/>
-            <a:ext cx="6952576" cy="5334000"/>
+            <a:off x="399396" y="990600"/>
+            <a:ext cx="8345209" cy="5410200"/>
           </a:xfrm>
           <a:prstGeom prst="rect">
             <a:avLst/>
@@ -7033,7 +6943,7 @@
     </p:spTree>
     <p:extLst>
       <p:ext uri="{BB962C8B-B14F-4D97-AF65-F5344CB8AC3E}">
-        <p14:creationId xmlns:p14="http://schemas.microsoft.com/office/powerpoint/2010/main" val="2133954445"/>
+        <p14:creationId xmlns:p14="http://schemas.microsoft.com/office/powerpoint/2010/main" val="1197279533"/>
       </p:ext>
     </p:extLst>
   </p:cSld>
@@ -7205,7 +7115,7 @@
         </p:nvSpPr>
         <p:spPr>
           <a:xfrm>
-            <a:off x="1524000" y="206375"/>
+            <a:off x="1524000" y="-152400"/>
             <a:ext cx="6096000" cy="1470025"/>
           </a:xfrm>
         </p:spPr>
@@ -7217,7 +7127,7 @@
           <a:p>
             <a:r>
               <a:rPr lang="en-US" sz="4000" b="1" dirty="0" smtClean="0"/>
-              <a:t>Data Splitting</a:t>
+              <a:t>Data Analysis and Insights</a:t>
             </a:r>
             <a:endParaRPr lang="en-US" sz="4000" b="1" dirty="0"/>
           </a:p>
@@ -7225,7 +7135,7 @@
       </p:sp>
       <p:pic>
         <p:nvPicPr>
-          <p:cNvPr id="27650" name="Picture 2"/>
+          <p:cNvPr id="24578" name="Picture 2"/>
           <p:cNvPicPr>
             <a:picLocks noChangeAspect="1" noChangeArrowheads="1"/>
           </p:cNvPicPr>
@@ -7239,13 +7149,13 @@
               </a:ext>
             </a:extLst>
           </a:blip>
-          <a:srcRect r="4251"/>
+          <a:srcRect t="-157" r="31204" b="20891"/>
           <a:stretch/>
         </p:blipFill>
         <p:spPr bwMode="auto">
           <a:xfrm>
-            <a:off x="90616" y="3124200"/>
-            <a:ext cx="8839396" cy="838200"/>
+            <a:off x="1514561" y="1219201"/>
+            <a:ext cx="6114878" cy="4160108"/>
           </a:xfrm>
           <a:prstGeom prst="rect">
             <a:avLst/>
@@ -7285,10 +7195,87 @@
           </a:extLst>
         </p:spPr>
       </p:pic>
+      <p:sp>
+        <p:nvSpPr>
+          <p:cNvPr id="3" name="Rectangle 2"/>
+          <p:cNvSpPr/>
+          <p:nvPr/>
+        </p:nvSpPr>
+        <p:spPr>
+          <a:xfrm>
+            <a:off x="495300" y="5352871"/>
+            <a:ext cx="8153400" cy="1200329"/>
+          </a:xfrm>
+          <a:prstGeom prst="rect">
+            <a:avLst/>
+          </a:prstGeom>
+        </p:spPr>
+        <p:txBody>
+          <a:bodyPr wrap="square">
+            <a:spAutoFit/>
+          </a:bodyPr>
+          <a:lstStyle/>
+          <a:p>
+            <a:r>
+              <a:rPr lang="en-US" b="1" dirty="0"/>
+              <a:t>Insights</a:t>
+            </a:r>
+            <a:r>
+              <a:rPr lang="en-US" dirty="0"/>
+              <a:t>:</a:t>
+            </a:r>
+          </a:p>
+          <a:p>
+            <a:pPr marL="285750" indent="-285750">
+              <a:buFont typeface="Arial" panose="020B0604020202020204" pitchFamily="34" charset="0"/>
+              <a:buChar char="•"/>
+            </a:pPr>
+            <a:r>
+              <a:rPr lang="en-US" dirty="0"/>
+              <a:t>There is a very good relation </a:t>
+            </a:r>
+            <a:r>
+              <a:rPr lang="en-US" dirty="0" err="1"/>
+              <a:t>betwen</a:t>
+            </a:r>
+            <a:r>
+              <a:rPr lang="en-US" dirty="0"/>
+              <a:t> rating and </a:t>
+            </a:r>
+            <a:r>
+              <a:rPr lang="en-US" dirty="0" err="1" smtClean="0"/>
+              <a:t>rating_type</a:t>
+            </a:r>
+            <a:endParaRPr lang="en-US" dirty="0" smtClean="0"/>
+          </a:p>
+          <a:p>
+            <a:pPr marL="285750" indent="-285750">
+              <a:buFont typeface="Arial" panose="020B0604020202020204" pitchFamily="34" charset="0"/>
+              <a:buChar char="•"/>
+            </a:pPr>
+            <a:r>
+              <a:rPr lang="en-US" dirty="0" smtClean="0"/>
+              <a:t>Page </a:t>
+            </a:r>
+            <a:r>
+              <a:rPr lang="en-US" dirty="0"/>
+              <a:t>number is has a negative correlation with rating, which means that as the page no. increases the rating of the </a:t>
+            </a:r>
+            <a:r>
+              <a:rPr lang="en-US" dirty="0" err="1"/>
+              <a:t>resturant</a:t>
+            </a:r>
+            <a:r>
+              <a:rPr lang="en-US" dirty="0"/>
+              <a:t> decreases</a:t>
+            </a:r>
+          </a:p>
+        </p:txBody>
+      </p:sp>
     </p:spTree>
     <p:extLst>
       <p:ext uri="{BB962C8B-B14F-4D97-AF65-F5344CB8AC3E}">
-        <p14:creationId xmlns:p14="http://schemas.microsoft.com/office/powerpoint/2010/main" val="2050303073"/>
+        <p14:creationId xmlns:p14="http://schemas.microsoft.com/office/powerpoint/2010/main" val="2829814814"/>
       </p:ext>
     </p:extLst>
   </p:cSld>
@@ -7334,8 +7321,8 @@
         </p:nvSpPr>
         <p:spPr>
           <a:xfrm>
-            <a:off x="1524000" y="206375"/>
-            <a:ext cx="6096000" cy="1470025"/>
+            <a:off x="2305050" y="2667000"/>
+            <a:ext cx="4533900" cy="1470025"/>
           </a:xfrm>
         </p:spPr>
         <p:txBody>
@@ -7345,81 +7332,17 @@
           <a:lstStyle/>
           <a:p>
             <a:r>
-              <a:rPr lang="en-US" sz="4000" b="1" dirty="0" smtClean="0"/>
-              <a:t>Modeling</a:t>
-            </a:r>
-            <a:endParaRPr lang="en-US" sz="4000" b="1" dirty="0"/>
-          </a:p>
-        </p:txBody>
-      </p:sp>
-      <p:pic>
-        <p:nvPicPr>
-          <p:cNvPr id="28674" name="Picture 2"/>
-          <p:cNvPicPr>
-            <a:picLocks noChangeAspect="1" noChangeArrowheads="1"/>
-          </p:cNvPicPr>
-          <p:nvPr/>
-        </p:nvPicPr>
-        <p:blipFill>
-          <a:blip r:embed="rId2">
-            <a:extLst>
-              <a:ext uri="{28A0092B-C50C-407E-A947-70E740481C1C}">
-                <a14:useLocalDpi xmlns:a14="http://schemas.microsoft.com/office/drawing/2010/main" val="0"/>
-              </a:ext>
-            </a:extLst>
-          </a:blip>
-          <a:srcRect/>
-          <a:stretch>
-            <a:fillRect/>
-          </a:stretch>
-        </p:blipFill>
-        <p:spPr bwMode="auto">
-          <a:xfrm>
-            <a:off x="498474" y="1371600"/>
-            <a:ext cx="8145463" cy="2819400"/>
-          </a:xfrm>
-          <a:prstGeom prst="rect">
-            <a:avLst/>
-          </a:prstGeom>
-          <a:noFill/>
-          <a:ln>
-            <a:noFill/>
-          </a:ln>
-          <a:effectLst/>
-          <a:extLst>
-            <a:ext uri="{909E8E84-426E-40DD-AFC4-6F175D3DCCD1}">
-              <a14:hiddenFill xmlns:a14="http://schemas.microsoft.com/office/drawing/2010/main">
-                <a:solidFill>
-                  <a:schemeClr val="accent1"/>
-                </a:solidFill>
-              </a14:hiddenFill>
-            </a:ext>
-            <a:ext uri="{91240B29-F687-4F45-9708-019B960494DF}">
-              <a14:hiddenLine xmlns:a14="http://schemas.microsoft.com/office/drawing/2010/main" w="9525">
-                <a:solidFill>
-                  <a:schemeClr val="tx1"/>
-                </a:solidFill>
-                <a:miter lim="800000"/>
-                <a:headEnd/>
-                <a:tailEnd/>
-              </a14:hiddenLine>
-            </a:ext>
-            <a:ext uri="{AF507438-7753-43E0-B8FC-AC1667EBCBE1}">
-              <a14:hiddenEffects xmlns:a14="http://schemas.microsoft.com/office/drawing/2010/main">
-                <a:effectLst>
-                  <a:outerShdw dist="35921" dir="2700000" algn="ctr" rotWithShape="0">
-                    <a:schemeClr val="bg2"/>
-                  </a:outerShdw>
-                </a:effectLst>
-              </a14:hiddenEffects>
-            </a:ext>
-          </a:extLst>
-        </p:spPr>
-      </p:pic>
+              <a:rPr lang="en-US" sz="6600" b="1" dirty="0" smtClean="0"/>
+              <a:t>Data Splitting</a:t>
+            </a:r>
+            <a:endParaRPr lang="en-US" sz="6600" b="1" dirty="0"/>
+          </a:p>
+        </p:txBody>
+      </p:sp>
     </p:spTree>
     <p:extLst>
       <p:ext uri="{BB962C8B-B14F-4D97-AF65-F5344CB8AC3E}">
-        <p14:creationId xmlns:p14="http://schemas.microsoft.com/office/powerpoint/2010/main" val="1760199511"/>
+        <p14:creationId xmlns:p14="http://schemas.microsoft.com/office/powerpoint/2010/main" val="1073129925"/>
       </p:ext>
     </p:extLst>
   </p:cSld>
@@ -7465,6 +7388,462 @@
         </p:nvSpPr>
         <p:spPr>
           <a:xfrm>
+            <a:off x="1524000" y="130175"/>
+            <a:ext cx="6096000" cy="1470025"/>
+          </a:xfrm>
+        </p:spPr>
+        <p:txBody>
+          <a:bodyPr>
+            <a:noAutofit/>
+          </a:bodyPr>
+          <a:lstStyle/>
+          <a:p>
+            <a:r>
+              <a:rPr lang="en-US" sz="4000" b="1" dirty="0" smtClean="0"/>
+              <a:t>Data Splitting</a:t>
+            </a:r>
+            <a:endParaRPr lang="en-US" sz="4000" b="1" dirty="0"/>
+          </a:p>
+        </p:txBody>
+      </p:sp>
+      <p:pic>
+        <p:nvPicPr>
+          <p:cNvPr id="25602" name="Picture 2"/>
+          <p:cNvPicPr>
+            <a:picLocks noChangeAspect="1" noChangeArrowheads="1"/>
+          </p:cNvPicPr>
+          <p:nvPr/>
+        </p:nvPicPr>
+        <p:blipFill rotWithShape="1">
+          <a:blip r:embed="rId2">
+            <a:extLst>
+              <a:ext uri="{28A0092B-C50C-407E-A947-70E740481C1C}">
+                <a14:useLocalDpi xmlns:a14="http://schemas.microsoft.com/office/drawing/2010/main" val="0"/>
+              </a:ext>
+            </a:extLst>
+          </a:blip>
+          <a:srcRect r="27869"/>
+          <a:stretch/>
+        </p:blipFill>
+        <p:spPr bwMode="auto">
+          <a:xfrm>
+            <a:off x="205616" y="1676400"/>
+            <a:ext cx="8616652" cy="4114800"/>
+          </a:xfrm>
+          <a:prstGeom prst="rect">
+            <a:avLst/>
+          </a:prstGeom>
+          <a:noFill/>
+          <a:ln>
+            <a:noFill/>
+          </a:ln>
+          <a:effectLst/>
+          <a:extLst>
+            <a:ext uri="{909E8E84-426E-40DD-AFC4-6F175D3DCCD1}">
+              <a14:hiddenFill xmlns:a14="http://schemas.microsoft.com/office/drawing/2010/main">
+                <a:solidFill>
+                  <a:schemeClr val="accent1"/>
+                </a:solidFill>
+              </a14:hiddenFill>
+            </a:ext>
+            <a:ext uri="{91240B29-F687-4F45-9708-019B960494DF}">
+              <a14:hiddenLine xmlns:a14="http://schemas.microsoft.com/office/drawing/2010/main" w="9525">
+                <a:solidFill>
+                  <a:schemeClr val="tx1"/>
+                </a:solidFill>
+                <a:miter lim="800000"/>
+                <a:headEnd/>
+                <a:tailEnd/>
+              </a14:hiddenLine>
+            </a:ext>
+            <a:ext uri="{AF507438-7753-43E0-B8FC-AC1667EBCBE1}">
+              <a14:hiddenEffects xmlns:a14="http://schemas.microsoft.com/office/drawing/2010/main">
+                <a:effectLst>
+                  <a:outerShdw dist="35921" dir="2700000" algn="ctr" rotWithShape="0">
+                    <a:schemeClr val="bg2"/>
+                  </a:outerShdw>
+                </a:effectLst>
+              </a14:hiddenEffects>
+            </a:ext>
+          </a:extLst>
+        </p:spPr>
+      </p:pic>
+    </p:spTree>
+    <p:extLst>
+      <p:ext uri="{BB962C8B-B14F-4D97-AF65-F5344CB8AC3E}">
+        <p14:creationId xmlns:p14="http://schemas.microsoft.com/office/powerpoint/2010/main" val="2366035400"/>
+      </p:ext>
+    </p:extLst>
+  </p:cSld>
+  <p:clrMapOvr>
+    <a:masterClrMapping/>
+  </p:clrMapOvr>
+  <p:timing>
+    <p:tnLst>
+      <p:par>
+        <p:cTn id="1" dur="indefinite" restart="never" nodeType="tmRoot"/>
+      </p:par>
+    </p:tnLst>
+  </p:timing>
+</p:sld>
+</file>
+
+<file path=ppt/slides/slide33.xml><?xml version="1.0" encoding="utf-8"?>
+<p:sld xmlns:a="http://schemas.openxmlformats.org/drawingml/2006/main" xmlns:r="http://schemas.openxmlformats.org/officeDocument/2006/relationships" xmlns:p="http://schemas.openxmlformats.org/presentationml/2006/main">
+  <p:cSld>
+    <p:spTree>
+      <p:nvGrpSpPr>
+        <p:cNvPr id="1" name=""/>
+        <p:cNvGrpSpPr/>
+        <p:nvPr/>
+      </p:nvGrpSpPr>
+      <p:grpSpPr>
+        <a:xfrm>
+          <a:off x="0" y="0"/>
+          <a:ext cx="0" cy="0"/>
+          <a:chOff x="0" y="0"/>
+          <a:chExt cx="0" cy="0"/>
+        </a:xfrm>
+      </p:grpSpPr>
+      <p:sp>
+        <p:nvSpPr>
+          <p:cNvPr id="2" name="Title 1"/>
+          <p:cNvSpPr>
+            <a:spLocks noGrp="1"/>
+          </p:cNvSpPr>
+          <p:nvPr>
+            <p:ph type="ctrTitle"/>
+          </p:nvPr>
+        </p:nvSpPr>
+        <p:spPr>
+          <a:xfrm>
+            <a:off x="1524000" y="-152400"/>
+            <a:ext cx="6096000" cy="1470025"/>
+          </a:xfrm>
+        </p:spPr>
+        <p:txBody>
+          <a:bodyPr>
+            <a:noAutofit/>
+          </a:bodyPr>
+          <a:lstStyle/>
+          <a:p>
+            <a:r>
+              <a:rPr lang="en-US" sz="4000" b="1" dirty="0" smtClean="0"/>
+              <a:t>Data Splitting</a:t>
+            </a:r>
+            <a:endParaRPr lang="en-US" sz="4000" b="1" dirty="0"/>
+          </a:p>
+        </p:txBody>
+      </p:sp>
+      <p:pic>
+        <p:nvPicPr>
+          <p:cNvPr id="26626" name="Picture 2"/>
+          <p:cNvPicPr>
+            <a:picLocks noChangeAspect="1" noChangeArrowheads="1"/>
+          </p:cNvPicPr>
+          <p:nvPr/>
+        </p:nvPicPr>
+        <p:blipFill>
+          <a:blip r:embed="rId2">
+            <a:extLst>
+              <a:ext uri="{28A0092B-C50C-407E-A947-70E740481C1C}">
+                <a14:useLocalDpi xmlns:a14="http://schemas.microsoft.com/office/drawing/2010/main" val="0"/>
+              </a:ext>
+            </a:extLst>
+          </a:blip>
+          <a:srcRect/>
+          <a:stretch>
+            <a:fillRect/>
+          </a:stretch>
+        </p:blipFill>
+        <p:spPr bwMode="auto">
+          <a:xfrm>
+            <a:off x="1095712" y="1219200"/>
+            <a:ext cx="6952576" cy="5334000"/>
+          </a:xfrm>
+          <a:prstGeom prst="rect">
+            <a:avLst/>
+          </a:prstGeom>
+          <a:noFill/>
+          <a:ln>
+            <a:noFill/>
+          </a:ln>
+          <a:effectLst/>
+          <a:extLst>
+            <a:ext uri="{909E8E84-426E-40DD-AFC4-6F175D3DCCD1}">
+              <a14:hiddenFill xmlns:a14="http://schemas.microsoft.com/office/drawing/2010/main">
+                <a:solidFill>
+                  <a:schemeClr val="accent1"/>
+                </a:solidFill>
+              </a14:hiddenFill>
+            </a:ext>
+            <a:ext uri="{91240B29-F687-4F45-9708-019B960494DF}">
+              <a14:hiddenLine xmlns:a14="http://schemas.microsoft.com/office/drawing/2010/main" w="9525">
+                <a:solidFill>
+                  <a:schemeClr val="tx1"/>
+                </a:solidFill>
+                <a:miter lim="800000"/>
+                <a:headEnd/>
+                <a:tailEnd/>
+              </a14:hiddenLine>
+            </a:ext>
+            <a:ext uri="{AF507438-7753-43E0-B8FC-AC1667EBCBE1}">
+              <a14:hiddenEffects xmlns:a14="http://schemas.microsoft.com/office/drawing/2010/main">
+                <a:effectLst>
+                  <a:outerShdw dist="35921" dir="2700000" algn="ctr" rotWithShape="0">
+                    <a:schemeClr val="bg2"/>
+                  </a:outerShdw>
+                </a:effectLst>
+              </a14:hiddenEffects>
+            </a:ext>
+          </a:extLst>
+        </p:spPr>
+      </p:pic>
+    </p:spTree>
+    <p:extLst>
+      <p:ext uri="{BB962C8B-B14F-4D97-AF65-F5344CB8AC3E}">
+        <p14:creationId xmlns:p14="http://schemas.microsoft.com/office/powerpoint/2010/main" val="2133954445"/>
+      </p:ext>
+    </p:extLst>
+  </p:cSld>
+  <p:clrMapOvr>
+    <a:masterClrMapping/>
+  </p:clrMapOvr>
+  <p:timing>
+    <p:tnLst>
+      <p:par>
+        <p:cTn id="1" dur="indefinite" restart="never" nodeType="tmRoot"/>
+      </p:par>
+    </p:tnLst>
+  </p:timing>
+</p:sld>
+</file>
+
+<file path=ppt/slides/slide34.xml><?xml version="1.0" encoding="utf-8"?>
+<p:sld xmlns:a="http://schemas.openxmlformats.org/drawingml/2006/main" xmlns:r="http://schemas.openxmlformats.org/officeDocument/2006/relationships" xmlns:p="http://schemas.openxmlformats.org/presentationml/2006/main">
+  <p:cSld>
+    <p:spTree>
+      <p:nvGrpSpPr>
+        <p:cNvPr id="1" name=""/>
+        <p:cNvGrpSpPr/>
+        <p:nvPr/>
+      </p:nvGrpSpPr>
+      <p:grpSpPr>
+        <a:xfrm>
+          <a:off x="0" y="0"/>
+          <a:ext cx="0" cy="0"/>
+          <a:chOff x="0" y="0"/>
+          <a:chExt cx="0" cy="0"/>
+        </a:xfrm>
+      </p:grpSpPr>
+      <p:sp>
+        <p:nvSpPr>
+          <p:cNvPr id="2" name="Title 1"/>
+          <p:cNvSpPr>
+            <a:spLocks noGrp="1"/>
+          </p:cNvSpPr>
+          <p:nvPr>
+            <p:ph type="ctrTitle"/>
+          </p:nvPr>
+        </p:nvSpPr>
+        <p:spPr>
+          <a:xfrm>
+            <a:off x="1524000" y="206375"/>
+            <a:ext cx="6096000" cy="1470025"/>
+          </a:xfrm>
+        </p:spPr>
+        <p:txBody>
+          <a:bodyPr>
+            <a:noAutofit/>
+          </a:bodyPr>
+          <a:lstStyle/>
+          <a:p>
+            <a:r>
+              <a:rPr lang="en-US" sz="4000" b="1" dirty="0" smtClean="0"/>
+              <a:t>Data Splitting</a:t>
+            </a:r>
+            <a:endParaRPr lang="en-US" sz="4000" b="1" dirty="0"/>
+          </a:p>
+        </p:txBody>
+      </p:sp>
+      <p:pic>
+        <p:nvPicPr>
+          <p:cNvPr id="27650" name="Picture 2"/>
+          <p:cNvPicPr>
+            <a:picLocks noChangeAspect="1" noChangeArrowheads="1"/>
+          </p:cNvPicPr>
+          <p:nvPr/>
+        </p:nvPicPr>
+        <p:blipFill rotWithShape="1">
+          <a:blip r:embed="rId2">
+            <a:extLst>
+              <a:ext uri="{28A0092B-C50C-407E-A947-70E740481C1C}">
+                <a14:useLocalDpi xmlns:a14="http://schemas.microsoft.com/office/drawing/2010/main" val="0"/>
+              </a:ext>
+            </a:extLst>
+          </a:blip>
+          <a:srcRect r="4251"/>
+          <a:stretch/>
+        </p:blipFill>
+        <p:spPr bwMode="auto">
+          <a:xfrm>
+            <a:off x="90616" y="3124200"/>
+            <a:ext cx="8839396" cy="838200"/>
+          </a:xfrm>
+          <a:prstGeom prst="rect">
+            <a:avLst/>
+          </a:prstGeom>
+          <a:noFill/>
+          <a:ln>
+            <a:noFill/>
+          </a:ln>
+          <a:effectLst/>
+          <a:extLst>
+            <a:ext uri="{909E8E84-426E-40DD-AFC4-6F175D3DCCD1}">
+              <a14:hiddenFill xmlns:a14="http://schemas.microsoft.com/office/drawing/2010/main">
+                <a:solidFill>
+                  <a:schemeClr val="accent1"/>
+                </a:solidFill>
+              </a14:hiddenFill>
+            </a:ext>
+            <a:ext uri="{91240B29-F687-4F45-9708-019B960494DF}">
+              <a14:hiddenLine xmlns:a14="http://schemas.microsoft.com/office/drawing/2010/main" w="9525">
+                <a:solidFill>
+                  <a:schemeClr val="tx1"/>
+                </a:solidFill>
+                <a:miter lim="800000"/>
+                <a:headEnd/>
+                <a:tailEnd/>
+              </a14:hiddenLine>
+            </a:ext>
+            <a:ext uri="{AF507438-7753-43E0-B8FC-AC1667EBCBE1}">
+              <a14:hiddenEffects xmlns:a14="http://schemas.microsoft.com/office/drawing/2010/main">
+                <a:effectLst>
+                  <a:outerShdw dist="35921" dir="2700000" algn="ctr" rotWithShape="0">
+                    <a:schemeClr val="bg2"/>
+                  </a:outerShdw>
+                </a:effectLst>
+              </a14:hiddenEffects>
+            </a:ext>
+          </a:extLst>
+        </p:spPr>
+      </p:pic>
+    </p:spTree>
+    <p:extLst>
+      <p:ext uri="{BB962C8B-B14F-4D97-AF65-F5344CB8AC3E}">
+        <p14:creationId xmlns:p14="http://schemas.microsoft.com/office/powerpoint/2010/main" val="2050303073"/>
+      </p:ext>
+    </p:extLst>
+  </p:cSld>
+  <p:clrMapOvr>
+    <a:masterClrMapping/>
+  </p:clrMapOvr>
+  <p:timing>
+    <p:tnLst>
+      <p:par>
+        <p:cTn id="1" dur="indefinite" restart="never" nodeType="tmRoot"/>
+      </p:par>
+    </p:tnLst>
+  </p:timing>
+</p:sld>
+</file>
+
+<file path=ppt/slides/slide35.xml><?xml version="1.0" encoding="utf-8"?>
+<p:sld xmlns:a="http://schemas.openxmlformats.org/drawingml/2006/main" xmlns:r="http://schemas.openxmlformats.org/officeDocument/2006/relationships" xmlns:p="http://schemas.openxmlformats.org/presentationml/2006/main">
+  <p:cSld>
+    <p:spTree>
+      <p:nvGrpSpPr>
+        <p:cNvPr id="1" name=""/>
+        <p:cNvGrpSpPr/>
+        <p:nvPr/>
+      </p:nvGrpSpPr>
+      <p:grpSpPr>
+        <a:xfrm>
+          <a:off x="0" y="0"/>
+          <a:ext cx="0" cy="0"/>
+          <a:chOff x="0" y="0"/>
+          <a:chExt cx="0" cy="0"/>
+        </a:xfrm>
+      </p:grpSpPr>
+      <p:sp>
+        <p:nvSpPr>
+          <p:cNvPr id="2" name="Title 1"/>
+          <p:cNvSpPr>
+            <a:spLocks noGrp="1"/>
+          </p:cNvSpPr>
+          <p:nvPr>
+            <p:ph type="ctrTitle"/>
+          </p:nvPr>
+        </p:nvSpPr>
+        <p:spPr>
+          <a:xfrm>
+            <a:off x="2305050" y="2667000"/>
+            <a:ext cx="4533900" cy="1470025"/>
+          </a:xfrm>
+        </p:spPr>
+        <p:txBody>
+          <a:bodyPr>
+            <a:noAutofit/>
+          </a:bodyPr>
+          <a:lstStyle/>
+          <a:p>
+            <a:r>
+              <a:rPr lang="en-US" sz="6600" b="1" dirty="0" smtClean="0"/>
+              <a:t>Modeling</a:t>
+            </a:r>
+            <a:endParaRPr lang="en-US" sz="6600" b="1" dirty="0"/>
+          </a:p>
+        </p:txBody>
+      </p:sp>
+    </p:spTree>
+    <p:extLst>
+      <p:ext uri="{BB962C8B-B14F-4D97-AF65-F5344CB8AC3E}">
+        <p14:creationId xmlns:p14="http://schemas.microsoft.com/office/powerpoint/2010/main" val="1544651649"/>
+      </p:ext>
+    </p:extLst>
+  </p:cSld>
+  <p:clrMapOvr>
+    <a:masterClrMapping/>
+  </p:clrMapOvr>
+  <p:timing>
+    <p:tnLst>
+      <p:par>
+        <p:cTn id="1" dur="indefinite" restart="never" nodeType="tmRoot"/>
+      </p:par>
+    </p:tnLst>
+  </p:timing>
+</p:sld>
+</file>
+
+<file path=ppt/slides/slide36.xml><?xml version="1.0" encoding="utf-8"?>
+<p:sld xmlns:a="http://schemas.openxmlformats.org/drawingml/2006/main" xmlns:r="http://schemas.openxmlformats.org/officeDocument/2006/relationships" xmlns:p="http://schemas.openxmlformats.org/presentationml/2006/main">
+  <p:cSld>
+    <p:spTree>
+      <p:nvGrpSpPr>
+        <p:cNvPr id="1" name=""/>
+        <p:cNvGrpSpPr/>
+        <p:nvPr/>
+      </p:nvGrpSpPr>
+      <p:grpSpPr>
+        <a:xfrm>
+          <a:off x="0" y="0"/>
+          <a:ext cx="0" cy="0"/>
+          <a:chOff x="0" y="0"/>
+          <a:chExt cx="0" cy="0"/>
+        </a:xfrm>
+      </p:grpSpPr>
+      <p:sp>
+        <p:nvSpPr>
+          <p:cNvPr id="2" name="Title 1"/>
+          <p:cNvSpPr>
+            <a:spLocks noGrp="1"/>
+          </p:cNvSpPr>
+          <p:nvPr>
+            <p:ph type="ctrTitle"/>
+          </p:nvPr>
+        </p:nvSpPr>
+        <p:spPr>
+          <a:xfrm>
             <a:off x="1524000" y="206375"/>
             <a:ext cx="6096000" cy="1470025"/>
           </a:xfrm>
@@ -7547,6 +7926,137 @@
           </a:extLst>
         </p:spPr>
       </p:pic>
+    </p:spTree>
+    <p:extLst>
+      <p:ext uri="{BB962C8B-B14F-4D97-AF65-F5344CB8AC3E}">
+        <p14:creationId xmlns:p14="http://schemas.microsoft.com/office/powerpoint/2010/main" val="1760199511"/>
+      </p:ext>
+    </p:extLst>
+  </p:cSld>
+  <p:clrMapOvr>
+    <a:masterClrMapping/>
+  </p:clrMapOvr>
+  <p:timing>
+    <p:tnLst>
+      <p:par>
+        <p:cTn id="1" dur="indefinite" restart="never" nodeType="tmRoot"/>
+      </p:par>
+    </p:tnLst>
+  </p:timing>
+</p:sld>
+</file>
+
+<file path=ppt/slides/slide37.xml><?xml version="1.0" encoding="utf-8"?>
+<p:sld xmlns:a="http://schemas.openxmlformats.org/drawingml/2006/main" xmlns:r="http://schemas.openxmlformats.org/officeDocument/2006/relationships" xmlns:p="http://schemas.openxmlformats.org/presentationml/2006/main">
+  <p:cSld>
+    <p:spTree>
+      <p:nvGrpSpPr>
+        <p:cNvPr id="1" name=""/>
+        <p:cNvGrpSpPr/>
+        <p:nvPr/>
+      </p:nvGrpSpPr>
+      <p:grpSpPr>
+        <a:xfrm>
+          <a:off x="0" y="0"/>
+          <a:ext cx="0" cy="0"/>
+          <a:chOff x="0" y="0"/>
+          <a:chExt cx="0" cy="0"/>
+        </a:xfrm>
+      </p:grpSpPr>
+      <p:sp>
+        <p:nvSpPr>
+          <p:cNvPr id="2" name="Title 1"/>
+          <p:cNvSpPr>
+            <a:spLocks noGrp="1"/>
+          </p:cNvSpPr>
+          <p:nvPr>
+            <p:ph type="ctrTitle"/>
+          </p:nvPr>
+        </p:nvSpPr>
+        <p:spPr>
+          <a:xfrm>
+            <a:off x="1524000" y="206375"/>
+            <a:ext cx="6096000" cy="1470025"/>
+          </a:xfrm>
+        </p:spPr>
+        <p:txBody>
+          <a:bodyPr>
+            <a:noAutofit/>
+          </a:bodyPr>
+          <a:lstStyle/>
+          <a:p>
+            <a:r>
+              <a:rPr lang="en-US" sz="4000" b="1" dirty="0" smtClean="0"/>
+              <a:t>Modeling</a:t>
+            </a:r>
+            <a:endParaRPr lang="en-US" sz="4000" b="1" dirty="0"/>
+          </a:p>
+        </p:txBody>
+      </p:sp>
+      <p:pic>
+        <p:nvPicPr>
+          <p:cNvPr id="28674" name="Picture 2"/>
+          <p:cNvPicPr>
+            <a:picLocks noChangeAspect="1" noChangeArrowheads="1"/>
+          </p:cNvPicPr>
+          <p:nvPr/>
+        </p:nvPicPr>
+        <p:blipFill>
+          <a:blip r:embed="rId2">
+            <a:extLst>
+              <a:ext uri="{28A0092B-C50C-407E-A947-70E740481C1C}">
+                <a14:useLocalDpi xmlns:a14="http://schemas.microsoft.com/office/drawing/2010/main" val="0"/>
+              </a:ext>
+            </a:extLst>
+          </a:blip>
+          <a:srcRect/>
+          <a:stretch>
+            <a:fillRect/>
+          </a:stretch>
+        </p:blipFill>
+        <p:spPr bwMode="auto">
+          <a:xfrm>
+            <a:off x="498474" y="1371600"/>
+            <a:ext cx="8145463" cy="2819400"/>
+          </a:xfrm>
+          <a:prstGeom prst="rect">
+            <a:avLst/>
+          </a:prstGeom>
+          <a:noFill/>
+          <a:ln>
+            <a:noFill/>
+          </a:ln>
+          <a:effectLst/>
+          <a:extLst>
+            <a:ext uri="{909E8E84-426E-40DD-AFC4-6F175D3DCCD1}">
+              <a14:hiddenFill xmlns:a14="http://schemas.microsoft.com/office/drawing/2010/main">
+                <a:solidFill>
+                  <a:schemeClr val="accent1"/>
+                </a:solidFill>
+              </a14:hiddenFill>
+            </a:ext>
+            <a:ext uri="{91240B29-F687-4F45-9708-019B960494DF}">
+              <a14:hiddenLine xmlns:a14="http://schemas.microsoft.com/office/drawing/2010/main" w="9525">
+                <a:solidFill>
+                  <a:schemeClr val="tx1"/>
+                </a:solidFill>
+                <a:miter lim="800000"/>
+                <a:headEnd/>
+                <a:tailEnd/>
+              </a14:hiddenLine>
+            </a:ext>
+            <a:ext uri="{AF507438-7753-43E0-B8FC-AC1667EBCBE1}">
+              <a14:hiddenEffects xmlns:a14="http://schemas.microsoft.com/office/drawing/2010/main">
+                <a:effectLst>
+                  <a:outerShdw dist="35921" dir="2700000" algn="ctr" rotWithShape="0">
+                    <a:schemeClr val="bg2"/>
+                  </a:outerShdw>
+                </a:effectLst>
+              </a14:hiddenEffects>
+            </a:ext>
+          </a:extLst>
+        </p:spPr>
+      </p:pic>
       <p:pic>
         <p:nvPicPr>
           <p:cNvPr id="29698" name="Picture 2"/>
@@ -7613,6 +8123,204 @@
     <p:extLst>
       <p:ext uri="{BB962C8B-B14F-4D97-AF65-F5344CB8AC3E}">
         <p14:creationId xmlns:p14="http://schemas.microsoft.com/office/powerpoint/2010/main" val="4204583383"/>
+      </p:ext>
+    </p:extLst>
+  </p:cSld>
+  <p:clrMapOvr>
+    <a:masterClrMapping/>
+  </p:clrMapOvr>
+  <p:timing>
+    <p:tnLst>
+      <p:par>
+        <p:cTn id="1" dur="indefinite" restart="never" nodeType="tmRoot"/>
+      </p:par>
+    </p:tnLst>
+  </p:timing>
+</p:sld>
+</file>
+
+<file path=ppt/slides/slide38.xml><?xml version="1.0" encoding="utf-8"?>
+<p:sld xmlns:a="http://schemas.openxmlformats.org/drawingml/2006/main" xmlns:r="http://schemas.openxmlformats.org/officeDocument/2006/relationships" xmlns:p="http://schemas.openxmlformats.org/presentationml/2006/main">
+  <p:cSld>
+    <p:spTree>
+      <p:nvGrpSpPr>
+        <p:cNvPr id="1" name=""/>
+        <p:cNvGrpSpPr/>
+        <p:nvPr/>
+      </p:nvGrpSpPr>
+      <p:grpSpPr>
+        <a:xfrm>
+          <a:off x="0" y="0"/>
+          <a:ext cx="0" cy="0"/>
+          <a:chOff x="0" y="0"/>
+          <a:chExt cx="0" cy="0"/>
+        </a:xfrm>
+      </p:grpSpPr>
+      <p:sp>
+        <p:nvSpPr>
+          <p:cNvPr id="2" name="Title 1"/>
+          <p:cNvSpPr>
+            <a:spLocks noGrp="1"/>
+          </p:cNvSpPr>
+          <p:nvPr>
+            <p:ph type="ctrTitle"/>
+          </p:nvPr>
+        </p:nvSpPr>
+        <p:spPr>
+          <a:xfrm>
+            <a:off x="1524000" y="206375"/>
+            <a:ext cx="6096000" cy="1470025"/>
+          </a:xfrm>
+        </p:spPr>
+        <p:txBody>
+          <a:bodyPr>
+            <a:noAutofit/>
+          </a:bodyPr>
+          <a:lstStyle/>
+          <a:p>
+            <a:r>
+              <a:rPr lang="en-US" sz="4000" b="1" dirty="0" smtClean="0"/>
+              <a:t>Prediction System</a:t>
+            </a:r>
+            <a:endParaRPr lang="en-US" sz="4000" b="1" dirty="0"/>
+          </a:p>
+        </p:txBody>
+      </p:sp>
+      <p:pic>
+        <p:nvPicPr>
+          <p:cNvPr id="1026" name="Picture 2"/>
+          <p:cNvPicPr>
+            <a:picLocks noChangeAspect="1" noChangeArrowheads="1"/>
+          </p:cNvPicPr>
+          <p:nvPr/>
+        </p:nvPicPr>
+        <p:blipFill>
+          <a:blip r:embed="rId2">
+            <a:extLst>
+              <a:ext uri="{28A0092B-C50C-407E-A947-70E740481C1C}">
+                <a14:useLocalDpi xmlns:a14="http://schemas.microsoft.com/office/drawing/2010/main" val="0"/>
+              </a:ext>
+            </a:extLst>
+          </a:blip>
+          <a:srcRect/>
+          <a:stretch>
+            <a:fillRect/>
+          </a:stretch>
+        </p:blipFill>
+        <p:spPr bwMode="auto">
+          <a:xfrm>
+            <a:off x="387871" y="1752600"/>
+            <a:ext cx="8368258" cy="3435350"/>
+          </a:xfrm>
+          <a:prstGeom prst="rect">
+            <a:avLst/>
+          </a:prstGeom>
+          <a:noFill/>
+          <a:ln>
+            <a:noFill/>
+          </a:ln>
+          <a:effectLst/>
+          <a:extLst>
+            <a:ext uri="{909E8E84-426E-40DD-AFC4-6F175D3DCCD1}">
+              <a14:hiddenFill xmlns:a14="http://schemas.microsoft.com/office/drawing/2010/main">
+                <a:solidFill>
+                  <a:schemeClr val="accent1"/>
+                </a:solidFill>
+              </a14:hiddenFill>
+            </a:ext>
+            <a:ext uri="{91240B29-F687-4F45-9708-019B960494DF}">
+              <a14:hiddenLine xmlns:a14="http://schemas.microsoft.com/office/drawing/2010/main" w="9525">
+                <a:solidFill>
+                  <a:schemeClr val="tx1"/>
+                </a:solidFill>
+                <a:miter lim="800000"/>
+                <a:headEnd/>
+                <a:tailEnd/>
+              </a14:hiddenLine>
+            </a:ext>
+            <a:ext uri="{AF507438-7753-43E0-B8FC-AC1667EBCBE1}">
+              <a14:hiddenEffects xmlns:a14="http://schemas.microsoft.com/office/drawing/2010/main">
+                <a:effectLst>
+                  <a:outerShdw dist="35921" dir="2700000" algn="ctr" rotWithShape="0">
+                    <a:schemeClr val="bg2"/>
+                  </a:outerShdw>
+                </a:effectLst>
+              </a14:hiddenEffects>
+            </a:ext>
+          </a:extLst>
+        </p:spPr>
+      </p:pic>
+    </p:spTree>
+    <p:extLst>
+      <p:ext uri="{BB962C8B-B14F-4D97-AF65-F5344CB8AC3E}">
+        <p14:creationId xmlns:p14="http://schemas.microsoft.com/office/powerpoint/2010/main" val="3227944677"/>
+      </p:ext>
+    </p:extLst>
+  </p:cSld>
+  <p:clrMapOvr>
+    <a:masterClrMapping/>
+  </p:clrMapOvr>
+  <p:timing>
+    <p:tnLst>
+      <p:par>
+        <p:cTn id="1" dur="indefinite" restart="never" nodeType="tmRoot"/>
+      </p:par>
+    </p:tnLst>
+  </p:timing>
+</p:sld>
+</file>
+
+<file path=ppt/slides/slide39.xml><?xml version="1.0" encoding="utf-8"?>
+<p:sld xmlns:a="http://schemas.openxmlformats.org/drawingml/2006/main" xmlns:r="http://schemas.openxmlformats.org/officeDocument/2006/relationships" xmlns:p="http://schemas.openxmlformats.org/presentationml/2006/main">
+  <p:cSld>
+    <p:spTree>
+      <p:nvGrpSpPr>
+        <p:cNvPr id="1" name=""/>
+        <p:cNvGrpSpPr/>
+        <p:nvPr/>
+      </p:nvGrpSpPr>
+      <p:grpSpPr>
+        <a:xfrm>
+          <a:off x="0" y="0"/>
+          <a:ext cx="0" cy="0"/>
+          <a:chOff x="0" y="0"/>
+          <a:chExt cx="0" cy="0"/>
+        </a:xfrm>
+      </p:grpSpPr>
+      <p:sp>
+        <p:nvSpPr>
+          <p:cNvPr id="2" name="Title 1"/>
+          <p:cNvSpPr>
+            <a:spLocks noGrp="1"/>
+          </p:cNvSpPr>
+          <p:nvPr>
+            <p:ph type="ctrTitle"/>
+          </p:nvPr>
+        </p:nvSpPr>
+        <p:spPr>
+          <a:xfrm>
+            <a:off x="2305050" y="2667000"/>
+            <a:ext cx="4533900" cy="1470025"/>
+          </a:xfrm>
+        </p:spPr>
+        <p:txBody>
+          <a:bodyPr>
+            <a:noAutofit/>
+          </a:bodyPr>
+          <a:lstStyle/>
+          <a:p>
+            <a:r>
+              <a:rPr lang="en-US" sz="6600" b="1" dirty="0" smtClean="0"/>
+              <a:t>Thank You</a:t>
+            </a:r>
+            <a:endParaRPr lang="en-US" sz="6600" b="1" dirty="0"/>
+          </a:p>
+        </p:txBody>
+      </p:sp>
+    </p:spTree>
+    <p:extLst>
+      <p:ext uri="{BB962C8B-B14F-4D97-AF65-F5344CB8AC3E}">
+        <p14:creationId xmlns:p14="http://schemas.microsoft.com/office/powerpoint/2010/main" val="2657984755"/>
       </p:ext>
     </p:extLst>
   </p:cSld>
@@ -8030,6 +8738,73 @@
         </p:nvSpPr>
         <p:spPr>
           <a:xfrm>
+            <a:off x="2362200" y="2667000"/>
+            <a:ext cx="4419600" cy="1470025"/>
+          </a:xfrm>
+        </p:spPr>
+        <p:txBody>
+          <a:bodyPr>
+            <a:noAutofit/>
+          </a:bodyPr>
+          <a:lstStyle/>
+          <a:p>
+            <a:r>
+              <a:rPr lang="en-US" sz="6600" b="1" dirty="0" smtClean="0"/>
+              <a:t>Data Cleaning</a:t>
+            </a:r>
+            <a:endParaRPr lang="en-US" sz="6600" b="1" dirty="0"/>
+          </a:p>
+        </p:txBody>
+      </p:sp>
+    </p:spTree>
+    <p:extLst>
+      <p:ext uri="{BB962C8B-B14F-4D97-AF65-F5344CB8AC3E}">
+        <p14:creationId xmlns:p14="http://schemas.microsoft.com/office/powerpoint/2010/main" val="3908757241"/>
+      </p:ext>
+    </p:extLst>
+  </p:cSld>
+  <p:clrMapOvr>
+    <a:masterClrMapping/>
+  </p:clrMapOvr>
+  <p:timing>
+    <p:tnLst>
+      <p:par>
+        <p:cTn id="1" dur="indefinite" restart="never" nodeType="tmRoot"/>
+      </p:par>
+    </p:tnLst>
+  </p:timing>
+</p:sld>
+</file>
+
+<file path=ppt/slides/slide7.xml><?xml version="1.0" encoding="utf-8"?>
+<p:sld xmlns:a="http://schemas.openxmlformats.org/drawingml/2006/main" xmlns:r="http://schemas.openxmlformats.org/officeDocument/2006/relationships" xmlns:p="http://schemas.openxmlformats.org/presentationml/2006/main">
+  <p:cSld>
+    <p:spTree>
+      <p:nvGrpSpPr>
+        <p:cNvPr id="1" name=""/>
+        <p:cNvGrpSpPr/>
+        <p:nvPr/>
+      </p:nvGrpSpPr>
+      <p:grpSpPr>
+        <a:xfrm>
+          <a:off x="0" y="0"/>
+          <a:ext cx="0" cy="0"/>
+          <a:chOff x="0" y="0"/>
+          <a:chExt cx="0" cy="0"/>
+        </a:xfrm>
+      </p:grpSpPr>
+      <p:sp>
+        <p:nvSpPr>
+          <p:cNvPr id="2" name="Title 1"/>
+          <p:cNvSpPr>
+            <a:spLocks noGrp="1"/>
+          </p:cNvSpPr>
+          <p:nvPr>
+            <p:ph type="ctrTitle"/>
+          </p:nvPr>
+        </p:nvSpPr>
+        <p:spPr>
+          <a:xfrm>
             <a:off x="2362200" y="152400"/>
             <a:ext cx="4419600" cy="1470025"/>
           </a:xfrm>
@@ -8130,7 +8905,7 @@
 </p:sld>
 </file>
 
-<file path=ppt/slides/slide7.xml><?xml version="1.0" encoding="utf-8"?>
+<file path=ppt/slides/slide8.xml><?xml version="1.0" encoding="utf-8"?>
 <p:sld xmlns:a="http://schemas.openxmlformats.org/drawingml/2006/main" xmlns:r="http://schemas.openxmlformats.org/officeDocument/2006/relationships" xmlns:p="http://schemas.openxmlformats.org/presentationml/2006/main">
   <p:cSld>
     <p:spTree>
@@ -8663,7 +9438,7 @@
 </p:sld>
 </file>
 
-<file path=ppt/slides/slide8.xml><?xml version="1.0" encoding="utf-8"?>
+<file path=ppt/slides/slide9.xml><?xml version="1.0" encoding="utf-8"?>
 <p:sld xmlns:a="http://schemas.openxmlformats.org/drawingml/2006/main" xmlns:r="http://schemas.openxmlformats.org/officeDocument/2006/relationships" xmlns:p="http://schemas.openxmlformats.org/presentationml/2006/main">
   <p:cSld>
     <p:spTree>
@@ -8880,241 +9655,6 @@
     <p:extLst>
       <p:ext uri="{BB962C8B-B14F-4D97-AF65-F5344CB8AC3E}">
         <p14:creationId xmlns:p14="http://schemas.microsoft.com/office/powerpoint/2010/main" val="1992020192"/>
-      </p:ext>
-    </p:extLst>
-  </p:cSld>
-  <p:clrMapOvr>
-    <a:masterClrMapping/>
-  </p:clrMapOvr>
-  <p:timing>
-    <p:tnLst>
-      <p:par>
-        <p:cTn id="1" dur="indefinite" restart="never" nodeType="tmRoot"/>
-      </p:par>
-    </p:tnLst>
-  </p:timing>
-</p:sld>
-</file>
-
-<file path=ppt/slides/slide9.xml><?xml version="1.0" encoding="utf-8"?>
-<p:sld xmlns:a="http://schemas.openxmlformats.org/drawingml/2006/main" xmlns:r="http://schemas.openxmlformats.org/officeDocument/2006/relationships" xmlns:p="http://schemas.openxmlformats.org/presentationml/2006/main">
-  <p:cSld>
-    <p:spTree>
-      <p:nvGrpSpPr>
-        <p:cNvPr id="1" name=""/>
-        <p:cNvGrpSpPr/>
-        <p:nvPr/>
-      </p:nvGrpSpPr>
-      <p:grpSpPr>
-        <a:xfrm>
-          <a:off x="0" y="0"/>
-          <a:ext cx="0" cy="0"/>
-          <a:chOff x="0" y="0"/>
-          <a:chExt cx="0" cy="0"/>
-        </a:xfrm>
-      </p:grpSpPr>
-      <p:sp>
-        <p:nvSpPr>
-          <p:cNvPr id="2" name="Title 1"/>
-          <p:cNvSpPr>
-            <a:spLocks noGrp="1"/>
-          </p:cNvSpPr>
-          <p:nvPr>
-            <p:ph type="ctrTitle"/>
-          </p:nvPr>
-        </p:nvSpPr>
-        <p:spPr>
-          <a:xfrm>
-            <a:off x="2362200" y="152400"/>
-            <a:ext cx="4419600" cy="1470025"/>
-          </a:xfrm>
-        </p:spPr>
-        <p:txBody>
-          <a:bodyPr>
-            <a:noAutofit/>
-          </a:bodyPr>
-          <a:lstStyle/>
-          <a:p>
-            <a:r>
-              <a:rPr lang="en-US" sz="4000" b="1" dirty="0" smtClean="0"/>
-              <a:t>Data Cleaning</a:t>
-            </a:r>
-            <a:endParaRPr lang="en-US" sz="4000" b="1" dirty="0"/>
-          </a:p>
-        </p:txBody>
-      </p:sp>
-      <p:pic>
-        <p:nvPicPr>
-          <p:cNvPr id="6146" name="Picture 2"/>
-          <p:cNvPicPr>
-            <a:picLocks noChangeAspect="1" noChangeArrowheads="1"/>
-          </p:cNvPicPr>
-          <p:nvPr/>
-        </p:nvPicPr>
-        <p:blipFill>
-          <a:blip r:embed="rId2">
-            <a:extLst>
-              <a:ext uri="{28A0092B-C50C-407E-A947-70E740481C1C}">
-                <a14:useLocalDpi xmlns:a14="http://schemas.microsoft.com/office/drawing/2010/main" val="0"/>
-              </a:ext>
-            </a:extLst>
-          </a:blip>
-          <a:srcRect/>
-          <a:stretch>
-            <a:fillRect/>
-          </a:stretch>
-        </p:blipFill>
-        <p:spPr bwMode="auto">
-          <a:xfrm>
-            <a:off x="609600" y="1447800"/>
-            <a:ext cx="1652954" cy="2209800"/>
-          </a:xfrm>
-          <a:prstGeom prst="rect">
-            <a:avLst/>
-          </a:prstGeom>
-          <a:noFill/>
-          <a:ln>
-            <a:noFill/>
-          </a:ln>
-          <a:effectLst/>
-          <a:extLst>
-            <a:ext uri="{909E8E84-426E-40DD-AFC4-6F175D3DCCD1}">
-              <a14:hiddenFill xmlns:a14="http://schemas.microsoft.com/office/drawing/2010/main">
-                <a:solidFill>
-                  <a:schemeClr val="accent1"/>
-                </a:solidFill>
-              </a14:hiddenFill>
-            </a:ext>
-            <a:ext uri="{91240B29-F687-4F45-9708-019B960494DF}">
-              <a14:hiddenLine xmlns:a14="http://schemas.microsoft.com/office/drawing/2010/main" w="9525">
-                <a:solidFill>
-                  <a:schemeClr val="tx1"/>
-                </a:solidFill>
-                <a:miter lim="800000"/>
-                <a:headEnd/>
-                <a:tailEnd/>
-              </a14:hiddenLine>
-            </a:ext>
-            <a:ext uri="{AF507438-7753-43E0-B8FC-AC1667EBCBE1}">
-              <a14:hiddenEffects xmlns:a14="http://schemas.microsoft.com/office/drawing/2010/main">
-                <a:effectLst>
-                  <a:outerShdw dist="35921" dir="2700000" algn="ctr" rotWithShape="0">
-                    <a:schemeClr val="bg2"/>
-                  </a:outerShdw>
-                </a:effectLst>
-              </a14:hiddenEffects>
-            </a:ext>
-          </a:extLst>
-        </p:spPr>
-      </p:pic>
-      <p:sp>
-        <p:nvSpPr>
-          <p:cNvPr id="3" name="Right Arrow 2"/>
-          <p:cNvSpPr/>
-          <p:nvPr/>
-        </p:nvSpPr>
-        <p:spPr>
-          <a:xfrm>
-            <a:off x="304800" y="1676400"/>
-            <a:ext cx="304800" cy="121158"/>
-          </a:xfrm>
-          <a:prstGeom prst="rightArrow">
-            <a:avLst/>
-          </a:prstGeom>
-        </p:spPr>
-        <p:style>
-          <a:lnRef idx="2">
-            <a:schemeClr val="accent2">
-              <a:shade val="50000"/>
-            </a:schemeClr>
-          </a:lnRef>
-          <a:fillRef idx="1">
-            <a:schemeClr val="accent2"/>
-          </a:fillRef>
-          <a:effectRef idx="0">
-            <a:schemeClr val="accent2"/>
-          </a:effectRef>
-          <a:fontRef idx="minor">
-            <a:schemeClr val="lt1"/>
-          </a:fontRef>
-        </p:style>
-        <p:txBody>
-          <a:bodyPr rtlCol="0" anchor="ctr"/>
-          <a:lstStyle/>
-          <a:p>
-            <a:pPr algn="ctr"/>
-            <a:endParaRPr lang="en-US"/>
-          </a:p>
-        </p:txBody>
-      </p:sp>
-      <p:pic>
-        <p:nvPicPr>
-          <p:cNvPr id="7170" name="Picture 2"/>
-          <p:cNvPicPr>
-            <a:picLocks noChangeAspect="1" noChangeArrowheads="1"/>
-          </p:cNvPicPr>
-          <p:nvPr/>
-        </p:nvPicPr>
-        <p:blipFill>
-          <a:blip r:embed="rId3">
-            <a:extLst>
-              <a:ext uri="{28A0092B-C50C-407E-A947-70E740481C1C}">
-                <a14:useLocalDpi xmlns:a14="http://schemas.microsoft.com/office/drawing/2010/main" val="0"/>
-              </a:ext>
-            </a:extLst>
-          </a:blip>
-          <a:srcRect/>
-          <a:stretch>
-            <a:fillRect/>
-          </a:stretch>
-        </p:blipFill>
-        <p:spPr bwMode="auto">
-          <a:xfrm>
-            <a:off x="2590800" y="1371600"/>
-            <a:ext cx="8364537" cy="5562600"/>
-          </a:xfrm>
-          <a:prstGeom prst="rect">
-            <a:avLst/>
-          </a:prstGeom>
-          <a:noFill/>
-          <a:ln>
-            <a:noFill/>
-          </a:ln>
-          <a:effectLst/>
-          <a:extLst>
-            <a:ext uri="{909E8E84-426E-40DD-AFC4-6F175D3DCCD1}">
-              <a14:hiddenFill xmlns:a14="http://schemas.microsoft.com/office/drawing/2010/main">
-                <a:solidFill>
-                  <a:schemeClr val="accent1"/>
-                </a:solidFill>
-              </a14:hiddenFill>
-            </a:ext>
-            <a:ext uri="{91240B29-F687-4F45-9708-019B960494DF}">
-              <a14:hiddenLine xmlns:a14="http://schemas.microsoft.com/office/drawing/2010/main" w="9525">
-                <a:solidFill>
-                  <a:schemeClr val="tx1"/>
-                </a:solidFill>
-                <a:miter lim="800000"/>
-                <a:headEnd/>
-                <a:tailEnd/>
-              </a14:hiddenLine>
-            </a:ext>
-            <a:ext uri="{AF507438-7753-43E0-B8FC-AC1667EBCBE1}">
-              <a14:hiddenEffects xmlns:a14="http://schemas.microsoft.com/office/drawing/2010/main">
-                <a:effectLst>
-                  <a:outerShdw dist="35921" dir="2700000" algn="ctr" rotWithShape="0">
-                    <a:schemeClr val="bg2"/>
-                  </a:outerShdw>
-                </a:effectLst>
-              </a14:hiddenEffects>
-            </a:ext>
-          </a:extLst>
-        </p:spPr>
-      </p:pic>
-    </p:spTree>
-    <p:extLst>
-      <p:ext uri="{BB962C8B-B14F-4D97-AF65-F5344CB8AC3E}">
-        <p14:creationId xmlns:p14="http://schemas.microsoft.com/office/powerpoint/2010/main" val="2712418149"/>
       </p:ext>
     </p:extLst>
   </p:cSld>

</xml_diff>